<commit_message>
TW edits for month and diagram
</commit_message>
<xml_diff>
--- a/docs/deployment_guide/images/headend-system-simulator-architecture-diagram.pptx
+++ b/docs/deployment_guide/images/headend-system-simulator-architecture-diagram.pptx
@@ -259,7 +259,7 @@
           <a:p>
             <a:fld id="{B536BDF9-59C5-F24F-8A2E-4145DBCAD367}" type="datetimeFigureOut">
               <a:rPr lang="en-US" smtClean="0"/>
-              <a:t>4/14/2023</a:t>
+              <a:t>5/1/2023</a:t>
             </a:fld>
             <a:endParaRPr lang="en-US"/>
           </a:p>
@@ -457,7 +457,7 @@
           <a:p>
             <a:fld id="{B536BDF9-59C5-F24F-8A2E-4145DBCAD367}" type="datetimeFigureOut">
               <a:rPr lang="en-US" smtClean="0"/>
-              <a:t>4/14/2023</a:t>
+              <a:t>5/1/2023</a:t>
             </a:fld>
             <a:endParaRPr lang="en-US"/>
           </a:p>
@@ -665,7 +665,7 @@
           <a:p>
             <a:fld id="{B536BDF9-59C5-F24F-8A2E-4145DBCAD367}" type="datetimeFigureOut">
               <a:rPr lang="en-US" smtClean="0"/>
-              <a:t>4/14/2023</a:t>
+              <a:t>5/1/2023</a:t>
             </a:fld>
             <a:endParaRPr lang="en-US"/>
           </a:p>
@@ -863,7 +863,7 @@
           <a:p>
             <a:fld id="{B536BDF9-59C5-F24F-8A2E-4145DBCAD367}" type="datetimeFigureOut">
               <a:rPr lang="en-US" smtClean="0"/>
-              <a:t>4/14/2023</a:t>
+              <a:t>5/1/2023</a:t>
             </a:fld>
             <a:endParaRPr lang="en-US"/>
           </a:p>
@@ -1138,7 +1138,7 @@
           <a:p>
             <a:fld id="{B536BDF9-59C5-F24F-8A2E-4145DBCAD367}" type="datetimeFigureOut">
               <a:rPr lang="en-US" smtClean="0"/>
-              <a:t>4/14/2023</a:t>
+              <a:t>5/1/2023</a:t>
             </a:fld>
             <a:endParaRPr lang="en-US"/>
           </a:p>
@@ -1403,7 +1403,7 @@
           <a:p>
             <a:fld id="{B536BDF9-59C5-F24F-8A2E-4145DBCAD367}" type="datetimeFigureOut">
               <a:rPr lang="en-US" smtClean="0"/>
-              <a:t>4/14/2023</a:t>
+              <a:t>5/1/2023</a:t>
             </a:fld>
             <a:endParaRPr lang="en-US"/>
           </a:p>
@@ -1815,7 +1815,7 @@
           <a:p>
             <a:fld id="{B536BDF9-59C5-F24F-8A2E-4145DBCAD367}" type="datetimeFigureOut">
               <a:rPr lang="en-US" smtClean="0"/>
-              <a:t>4/14/2023</a:t>
+              <a:t>5/1/2023</a:t>
             </a:fld>
             <a:endParaRPr lang="en-US"/>
           </a:p>
@@ -1956,7 +1956,7 @@
           <a:p>
             <a:fld id="{B536BDF9-59C5-F24F-8A2E-4145DBCAD367}" type="datetimeFigureOut">
               <a:rPr lang="en-US" smtClean="0"/>
-              <a:t>4/14/2023</a:t>
+              <a:t>5/1/2023</a:t>
             </a:fld>
             <a:endParaRPr lang="en-US"/>
           </a:p>
@@ -2069,7 +2069,7 @@
           <a:p>
             <a:fld id="{B536BDF9-59C5-F24F-8A2E-4145DBCAD367}" type="datetimeFigureOut">
               <a:rPr lang="en-US" smtClean="0"/>
-              <a:t>4/14/2023</a:t>
+              <a:t>5/1/2023</a:t>
             </a:fld>
             <a:endParaRPr lang="en-US"/>
           </a:p>
@@ -2380,7 +2380,7 @@
           <a:p>
             <a:fld id="{B536BDF9-59C5-F24F-8A2E-4145DBCAD367}" type="datetimeFigureOut">
               <a:rPr lang="en-US" smtClean="0"/>
-              <a:t>4/14/2023</a:t>
+              <a:t>5/1/2023</a:t>
             </a:fld>
             <a:endParaRPr lang="en-US"/>
           </a:p>
@@ -2668,7 +2668,7 @@
           <a:p>
             <a:fld id="{B536BDF9-59C5-F24F-8A2E-4145DBCAD367}" type="datetimeFigureOut">
               <a:rPr lang="en-US" smtClean="0"/>
-              <a:t>4/14/2023</a:t>
+              <a:t>5/1/2023</a:t>
             </a:fld>
             <a:endParaRPr lang="en-US"/>
           </a:p>
@@ -2909,7 +2909,7 @@
           <a:p>
             <a:fld id="{B536BDF9-59C5-F24F-8A2E-4145DBCAD367}" type="datetimeFigureOut">
               <a:rPr lang="en-US" smtClean="0"/>
-              <a:t>4/14/2023</a:t>
+              <a:t>5/1/2023</a:t>
             </a:fld>
             <a:endParaRPr lang="en-US"/>
           </a:p>
@@ -3354,7 +3354,7 @@
         <p:spPr bwMode="auto">
           <a:xfrm>
             <a:off x="466090" y="2514211"/>
-            <a:ext cx="469900" cy="469900"/>
+            <a:ext cx="457200" cy="457200"/>
           </a:xfrm>
           <a:prstGeom prst="rect">
             <a:avLst/>
@@ -3396,19 +3396,18 @@
           <p:cNvCxnSpPr>
             <a:cxnSpLocks/>
             <a:stCxn id="54" idx="1"/>
-            <a:endCxn id="47" idx="3"/>
           </p:cNvCxnSpPr>
           <p:nvPr/>
         </p:nvCxnSpPr>
         <p:spPr>
           <a:xfrm flipH="1">
-            <a:off x="8056689" y="1173695"/>
-            <a:ext cx="1635502" cy="0"/>
+            <a:off x="8056689" y="1167345"/>
+            <a:ext cx="1635502" cy="6350"/>
           </a:xfrm>
           <a:prstGeom prst="straightConnector1">
             <a:avLst/>
           </a:prstGeom>
-          <a:ln w="12700">
+          <a:ln w="15875">
             <a:solidFill>
               <a:schemeClr val="tx2"/>
             </a:solidFill>
@@ -3443,19 +3442,18 @@
           <p:cNvCxnSpPr>
             <a:cxnSpLocks/>
             <a:stCxn id="13" idx="0"/>
-            <a:endCxn id="103" idx="1"/>
           </p:cNvCxnSpPr>
           <p:nvPr/>
         </p:nvCxnSpPr>
         <p:spPr>
           <a:xfrm rot="5400000" flipH="1" flipV="1">
-            <a:off x="624811" y="1219230"/>
-            <a:ext cx="1371211" cy="1218752"/>
+            <a:off x="621636" y="1216055"/>
+            <a:ext cx="1371211" cy="1225102"/>
           </a:xfrm>
           <a:prstGeom prst="bentConnector2">
             <a:avLst/>
           </a:prstGeom>
-          <a:ln w="12700">
+          <a:ln w="15875">
             <a:solidFill>
               <a:schemeClr val="tx2"/>
             </a:solidFill>
@@ -3490,19 +3488,18 @@
           <p:cNvCxnSpPr>
             <a:cxnSpLocks/>
             <a:stCxn id="189" idx="2"/>
-            <a:endCxn id="9" idx="1"/>
           </p:cNvCxnSpPr>
           <p:nvPr/>
         </p:nvCxnSpPr>
         <p:spPr>
           <a:xfrm rot="16200000" flipH="1">
-            <a:off x="736414" y="3198036"/>
-            <a:ext cx="1146527" cy="1217274"/>
+            <a:off x="742769" y="3204391"/>
+            <a:ext cx="1133817" cy="1217274"/>
           </a:xfrm>
           <a:prstGeom prst="bentConnector2">
             <a:avLst/>
           </a:prstGeom>
-          <a:ln w="12700">
+          <a:ln w="15875">
             <a:solidFill>
               <a:schemeClr val="tx2"/>
             </a:solidFill>
@@ -3541,8 +3538,8 @@
         </p:nvSpPr>
         <p:spPr bwMode="auto">
           <a:xfrm>
-            <a:off x="152400" y="2971800"/>
-            <a:ext cx="1097280" cy="261610"/>
+            <a:off x="106680" y="2971800"/>
+            <a:ext cx="1188720" cy="274320"/>
           </a:xfrm>
           <a:prstGeom prst="rect">
             <a:avLst/>
@@ -3676,7 +3673,7 @@
           <a:p>
             <a:pPr algn="ctr" eaLnBrk="1" hangingPunct="1"/>
             <a:r>
-              <a:rPr lang="en-US" altLang="en-US" sz="1100" dirty="0">
+              <a:rPr lang="en-US" altLang="en-US" sz="1200" dirty="0">
                 <a:latin typeface="Arial" panose="020B0604020202020204" pitchFamily="34" charset="0"/>
                 <a:ea typeface="Amazon Ember" panose="020B0603020204020204" pitchFamily="34" charset="0"/>
                 <a:cs typeface="Arial" panose="020B0604020202020204" pitchFamily="34" charset="0"/>
@@ -3707,7 +3704,7 @@
             <a:avLst/>
           </a:prstGeom>
           <a:noFill/>
-          <a:ln w="12700">
+          <a:ln w="15875">
             <a:solidFill>
               <a:schemeClr val="tx1"/>
             </a:solidFill>
@@ -3788,546 +3785,6 @@
           <a:prstGeom prst="rect">
             <a:avLst/>
           </a:prstGeom>
-        </p:spPr>
-      </p:pic>
-      <p:pic>
-        <p:nvPicPr>
-          <p:cNvPr id="2" name="Graphic 13">
-            <a:extLst>
-              <a:ext uri="{FF2B5EF4-FFF2-40B4-BE49-F238E27FC236}">
-                <a16:creationId xmlns:a16="http://schemas.microsoft.com/office/drawing/2014/main" id="{E5FA42C4-BAC3-A26E-CA41-7E519D768EF0}"/>
-              </a:ext>
-            </a:extLst>
-          </p:cNvPr>
-          <p:cNvPicPr>
-            <a:picLocks noChangeAspect="1" noChangeArrowheads="1"/>
-          </p:cNvPicPr>
-          <p:nvPr/>
-        </p:nvPicPr>
-        <p:blipFill>
-          <a:blip r:embed="rId6">
-            <a:extLst>
-              <a:ext uri="{28A0092B-C50C-407E-A947-70E740481C1C}">
-                <a14:useLocalDpi xmlns:a14="http://schemas.microsoft.com/office/drawing/2010/main" val="0"/>
-              </a:ext>
-            </a:extLst>
-          </a:blip>
-          <a:srcRect/>
-          <a:stretch>
-            <a:fillRect/>
-          </a:stretch>
-        </p:blipFill>
-        <p:spPr bwMode="auto">
-          <a:xfrm>
-            <a:off x="3017520" y="2103120"/>
-            <a:ext cx="457200" cy="457200"/>
-          </a:xfrm>
-          <a:prstGeom prst="rect">
-            <a:avLst/>
-          </a:prstGeom>
-          <a:noFill/>
-          <a:ln>
-            <a:noFill/>
-          </a:ln>
-          <a:extLst>
-            <a:ext uri="{909E8E84-426E-40DD-AFC4-6F175D3DCCD1}">
-              <a14:hiddenFill xmlns:a14="http://schemas.microsoft.com/office/drawing/2010/main">
-                <a:solidFill>
-                  <a:srgbClr val="FFFFFF"/>
-                </a:solidFill>
-              </a14:hiddenFill>
-            </a:ext>
-            <a:ext uri="{91240B29-F687-4F45-9708-019B960494DF}">
-              <a14:hiddenLine xmlns:a14="http://schemas.microsoft.com/office/drawing/2010/main" w="9525">
-                <a:solidFill>
-                  <a:srgbClr val="000000"/>
-                </a:solidFill>
-                <a:miter lim="800000"/>
-                <a:headEnd/>
-                <a:tailEnd/>
-              </a14:hiddenLine>
-            </a:ext>
-          </a:extLst>
-        </p:spPr>
-      </p:pic>
-      <p:pic>
-        <p:nvPicPr>
-          <p:cNvPr id="3" name="Graphic 29">
-            <a:extLst>
-              <a:ext uri="{FF2B5EF4-FFF2-40B4-BE49-F238E27FC236}">
-                <a16:creationId xmlns:a16="http://schemas.microsoft.com/office/drawing/2014/main" id="{3F8AD450-F9AB-18F9-15FB-38A6BF784D49}"/>
-              </a:ext>
-            </a:extLst>
-          </p:cNvPr>
-          <p:cNvPicPr>
-            <a:picLocks noChangeAspect="1" noChangeArrowheads="1"/>
-          </p:cNvPicPr>
-          <p:nvPr/>
-        </p:nvPicPr>
-        <p:blipFill>
-          <a:blip r:embed="rId7">
-            <a:extLst>
-              <a:ext uri="{28A0092B-C50C-407E-A947-70E740481C1C}">
-                <a14:useLocalDpi xmlns:a14="http://schemas.microsoft.com/office/drawing/2010/main" val="0"/>
-              </a:ext>
-            </a:extLst>
-          </a:blip>
-          <a:srcRect/>
-          <a:stretch>
-            <a:fillRect/>
-          </a:stretch>
-        </p:blipFill>
-        <p:spPr bwMode="auto">
-          <a:xfrm>
-            <a:off x="4246955" y="1572768"/>
-            <a:ext cx="457200" cy="457200"/>
-          </a:xfrm>
-          <a:prstGeom prst="rect">
-            <a:avLst/>
-          </a:prstGeom>
-          <a:noFill/>
-          <a:ln>
-            <a:noFill/>
-          </a:ln>
-          <a:extLst>
-            <a:ext uri="{909E8E84-426E-40DD-AFC4-6F175D3DCCD1}">
-              <a14:hiddenFill xmlns:a14="http://schemas.microsoft.com/office/drawing/2010/main">
-                <a:solidFill>
-                  <a:srgbClr val="FFFFFF"/>
-                </a:solidFill>
-              </a14:hiddenFill>
-            </a:ext>
-            <a:ext uri="{91240B29-F687-4F45-9708-019B960494DF}">
-              <a14:hiddenLine xmlns:a14="http://schemas.microsoft.com/office/drawing/2010/main" w="9525">
-                <a:solidFill>
-                  <a:srgbClr val="000000"/>
-                </a:solidFill>
-                <a:miter lim="800000"/>
-                <a:headEnd/>
-                <a:tailEnd/>
-              </a14:hiddenLine>
-            </a:ext>
-          </a:extLst>
-        </p:spPr>
-      </p:pic>
-      <p:pic>
-        <p:nvPicPr>
-          <p:cNvPr id="4" name="Graphic 29">
-            <a:extLst>
-              <a:ext uri="{FF2B5EF4-FFF2-40B4-BE49-F238E27FC236}">
-                <a16:creationId xmlns:a16="http://schemas.microsoft.com/office/drawing/2014/main" id="{6C359C9A-6E76-7B79-3AF2-D1F7788E1941}"/>
-              </a:ext>
-            </a:extLst>
-          </p:cNvPr>
-          <p:cNvPicPr>
-            <a:picLocks noChangeAspect="1" noChangeArrowheads="1"/>
-          </p:cNvPicPr>
-          <p:nvPr/>
-        </p:nvPicPr>
-        <p:blipFill>
-          <a:blip r:embed="rId8">
-            <a:extLst>
-              <a:ext uri="{28A0092B-C50C-407E-A947-70E740481C1C}">
-                <a14:useLocalDpi xmlns:a14="http://schemas.microsoft.com/office/drawing/2010/main" val="0"/>
-              </a:ext>
-            </a:extLst>
-          </a:blip>
-          <a:srcRect/>
-          <a:stretch>
-            <a:fillRect/>
-          </a:stretch>
-        </p:blipFill>
-        <p:spPr bwMode="auto">
-          <a:xfrm>
-            <a:off x="4251960" y="2555207"/>
-            <a:ext cx="457200" cy="457200"/>
-          </a:xfrm>
-          <a:prstGeom prst="rect">
-            <a:avLst/>
-          </a:prstGeom>
-          <a:noFill/>
-          <a:ln>
-            <a:noFill/>
-          </a:ln>
-          <a:extLst>
-            <a:ext uri="{909E8E84-426E-40DD-AFC4-6F175D3DCCD1}">
-              <a14:hiddenFill xmlns:a14="http://schemas.microsoft.com/office/drawing/2010/main">
-                <a:solidFill>
-                  <a:srgbClr val="FFFFFF"/>
-                </a:solidFill>
-              </a14:hiddenFill>
-            </a:ext>
-            <a:ext uri="{91240B29-F687-4F45-9708-019B960494DF}">
-              <a14:hiddenLine xmlns:a14="http://schemas.microsoft.com/office/drawing/2010/main" w="9525">
-                <a:solidFill>
-                  <a:srgbClr val="000000"/>
-                </a:solidFill>
-                <a:miter lim="800000"/>
-                <a:headEnd/>
-                <a:tailEnd/>
-              </a14:hiddenLine>
-            </a:ext>
-          </a:extLst>
-        </p:spPr>
-      </p:pic>
-      <p:pic>
-        <p:nvPicPr>
-          <p:cNvPr id="6" name="Graphic 14">
-            <a:extLst>
-              <a:ext uri="{FF2B5EF4-FFF2-40B4-BE49-F238E27FC236}">
-                <a16:creationId xmlns:a16="http://schemas.microsoft.com/office/drawing/2014/main" id="{68EC145F-5D65-BA86-E943-23BE4BD89C8F}"/>
-              </a:ext>
-            </a:extLst>
-          </p:cNvPr>
-          <p:cNvPicPr>
-            <a:picLocks noChangeAspect="1" noChangeArrowheads="1"/>
-          </p:cNvPicPr>
-          <p:nvPr/>
-        </p:nvPicPr>
-        <p:blipFill>
-          <a:blip r:embed="rId9">
-            <a:extLst>
-              <a:ext uri="{28A0092B-C50C-407E-A947-70E740481C1C}">
-                <a14:useLocalDpi xmlns:a14="http://schemas.microsoft.com/office/drawing/2010/main" val="0"/>
-              </a:ext>
-            </a:extLst>
-          </a:blip>
-          <a:srcRect/>
-          <a:stretch>
-            <a:fillRect/>
-          </a:stretch>
-        </p:blipFill>
-        <p:spPr bwMode="auto">
-          <a:xfrm>
-            <a:off x="4140261" y="4151337"/>
-            <a:ext cx="457200" cy="457200"/>
-          </a:xfrm>
-          <a:prstGeom prst="rect">
-            <a:avLst/>
-          </a:prstGeom>
-          <a:noFill/>
-          <a:ln>
-            <a:noFill/>
-          </a:ln>
-          <a:extLst>
-            <a:ext uri="{909E8E84-426E-40DD-AFC4-6F175D3DCCD1}">
-              <a14:hiddenFill xmlns:a14="http://schemas.microsoft.com/office/drawing/2010/main">
-                <a:solidFill>
-                  <a:srgbClr val="FFFFFF"/>
-                </a:solidFill>
-              </a14:hiddenFill>
-            </a:ext>
-            <a:ext uri="{91240B29-F687-4F45-9708-019B960494DF}">
-              <a14:hiddenLine xmlns:a14="http://schemas.microsoft.com/office/drawing/2010/main" w="9525">
-                <a:solidFill>
-                  <a:srgbClr val="000000"/>
-                </a:solidFill>
-                <a:miter lim="800000"/>
-                <a:headEnd/>
-                <a:tailEnd/>
-              </a14:hiddenLine>
-            </a:ext>
-          </a:extLst>
-        </p:spPr>
-      </p:pic>
-      <p:pic>
-        <p:nvPicPr>
-          <p:cNvPr id="7" name="Graphic 6">
-            <a:extLst>
-              <a:ext uri="{FF2B5EF4-FFF2-40B4-BE49-F238E27FC236}">
-                <a16:creationId xmlns:a16="http://schemas.microsoft.com/office/drawing/2014/main" id="{DAA2128D-581E-675A-9DDC-69ECF86218AB}"/>
-              </a:ext>
-            </a:extLst>
-          </p:cNvPr>
-          <p:cNvPicPr>
-            <a:picLocks noChangeAspect="1" noChangeArrowheads="1"/>
-          </p:cNvPicPr>
-          <p:nvPr/>
-        </p:nvPicPr>
-        <p:blipFill>
-          <a:blip r:embed="rId10">
-            <a:extLst>
-              <a:ext uri="{28A0092B-C50C-407E-A947-70E740481C1C}">
-                <a14:useLocalDpi xmlns:a14="http://schemas.microsoft.com/office/drawing/2010/main" val="0"/>
-              </a:ext>
-            </a:extLst>
-          </a:blip>
-          <a:srcRect/>
-          <a:stretch>
-            <a:fillRect/>
-          </a:stretch>
-        </p:blipFill>
-        <p:spPr bwMode="auto">
-          <a:xfrm>
-            <a:off x="6349417" y="2414016"/>
-            <a:ext cx="762000" cy="762000"/>
-          </a:xfrm>
-          <a:prstGeom prst="rect">
-            <a:avLst/>
-          </a:prstGeom>
-          <a:noFill/>
-          <a:ln>
-            <a:noFill/>
-          </a:ln>
-          <a:extLst>
-            <a:ext uri="{909E8E84-426E-40DD-AFC4-6F175D3DCCD1}">
-              <a14:hiddenFill xmlns:a14="http://schemas.microsoft.com/office/drawing/2010/main">
-                <a:solidFill>
-                  <a:srgbClr val="FFFFFF"/>
-                </a:solidFill>
-              </a14:hiddenFill>
-            </a:ext>
-            <a:ext uri="{91240B29-F687-4F45-9708-019B960494DF}">
-              <a14:hiddenLine xmlns:a14="http://schemas.microsoft.com/office/drawing/2010/main" w="9525">
-                <a:solidFill>
-                  <a:srgbClr val="000000"/>
-                </a:solidFill>
-                <a:miter lim="800000"/>
-                <a:headEnd/>
-                <a:tailEnd/>
-              </a14:hiddenLine>
-            </a:ext>
-          </a:extLst>
-        </p:spPr>
-      </p:pic>
-      <p:pic>
-        <p:nvPicPr>
-          <p:cNvPr id="9" name="Graphic 22">
-            <a:extLst>
-              <a:ext uri="{FF2B5EF4-FFF2-40B4-BE49-F238E27FC236}">
-                <a16:creationId xmlns:a16="http://schemas.microsoft.com/office/drawing/2014/main" id="{CB950015-E0B8-7D0A-FCA9-B1DE64C936EB}"/>
-              </a:ext>
-            </a:extLst>
-          </p:cNvPr>
-          <p:cNvPicPr>
-            <a:picLocks noChangeAspect="1" noChangeArrowheads="1"/>
-          </p:cNvPicPr>
-          <p:nvPr/>
-        </p:nvPicPr>
-        <p:blipFill>
-          <a:blip r:embed="rId11">
-            <a:extLst>
-              <a:ext uri="{28A0092B-C50C-407E-A947-70E740481C1C}">
-                <a14:useLocalDpi xmlns:a14="http://schemas.microsoft.com/office/drawing/2010/main" val="0"/>
-              </a:ext>
-            </a:extLst>
-          </a:blip>
-          <a:srcRect/>
-          <a:stretch>
-            <a:fillRect/>
-          </a:stretch>
-        </p:blipFill>
-        <p:spPr bwMode="auto">
-          <a:xfrm>
-            <a:off x="1918314" y="4151337"/>
-            <a:ext cx="457200" cy="457200"/>
-          </a:xfrm>
-          <a:prstGeom prst="rect">
-            <a:avLst/>
-          </a:prstGeom>
-          <a:noFill/>
-          <a:ln>
-            <a:noFill/>
-          </a:ln>
-          <a:extLst>
-            <a:ext uri="{909E8E84-426E-40DD-AFC4-6F175D3DCCD1}">
-              <a14:hiddenFill xmlns:a14="http://schemas.microsoft.com/office/drawing/2010/main">
-                <a:solidFill>
-                  <a:srgbClr val="FFFFFF"/>
-                </a:solidFill>
-              </a14:hiddenFill>
-            </a:ext>
-            <a:ext uri="{91240B29-F687-4F45-9708-019B960494DF}">
-              <a14:hiddenLine xmlns:a14="http://schemas.microsoft.com/office/drawing/2010/main" w="9525">
-                <a:solidFill>
-                  <a:srgbClr val="000000"/>
-                </a:solidFill>
-                <a:miter lim="800000"/>
-                <a:headEnd/>
-                <a:tailEnd/>
-              </a14:hiddenLine>
-            </a:ext>
-          </a:extLst>
-        </p:spPr>
-      </p:pic>
-      <p:pic>
-        <p:nvPicPr>
-          <p:cNvPr id="17" name="Graphic 13">
-            <a:extLst>
-              <a:ext uri="{FF2B5EF4-FFF2-40B4-BE49-F238E27FC236}">
-                <a16:creationId xmlns:a16="http://schemas.microsoft.com/office/drawing/2014/main" id="{7D424B3F-CD6E-6676-D926-8E34D70127BA}"/>
-              </a:ext>
-            </a:extLst>
-          </p:cNvPr>
-          <p:cNvPicPr>
-            <a:picLocks noChangeAspect="1" noChangeArrowheads="1"/>
-          </p:cNvPicPr>
-          <p:nvPr/>
-        </p:nvPicPr>
-        <p:blipFill>
-          <a:blip r:embed="rId6">
-            <a:extLst>
-              <a:ext uri="{28A0092B-C50C-407E-A947-70E740481C1C}">
-                <a14:useLocalDpi xmlns:a14="http://schemas.microsoft.com/office/drawing/2010/main" val="0"/>
-              </a:ext>
-            </a:extLst>
-          </a:blip>
-          <a:srcRect/>
-          <a:stretch>
-            <a:fillRect/>
-          </a:stretch>
-        </p:blipFill>
-        <p:spPr bwMode="auto">
-          <a:xfrm>
-            <a:off x="3017520" y="3033569"/>
-            <a:ext cx="457200" cy="457200"/>
-          </a:xfrm>
-          <a:prstGeom prst="rect">
-            <a:avLst/>
-          </a:prstGeom>
-          <a:noFill/>
-          <a:ln>
-            <a:noFill/>
-          </a:ln>
-          <a:extLst>
-            <a:ext uri="{909E8E84-426E-40DD-AFC4-6F175D3DCCD1}">
-              <a14:hiddenFill xmlns:a14="http://schemas.microsoft.com/office/drawing/2010/main">
-                <a:solidFill>
-                  <a:srgbClr val="FFFFFF"/>
-                </a:solidFill>
-              </a14:hiddenFill>
-            </a:ext>
-            <a:ext uri="{91240B29-F687-4F45-9708-019B960494DF}">
-              <a14:hiddenLine xmlns:a14="http://schemas.microsoft.com/office/drawing/2010/main" w="9525">
-                <a:solidFill>
-                  <a:srgbClr val="000000"/>
-                </a:solidFill>
-                <a:miter lim="800000"/>
-                <a:headEnd/>
-                <a:tailEnd/>
-              </a14:hiddenLine>
-            </a:ext>
-          </a:extLst>
-        </p:spPr>
-      </p:pic>
-      <p:pic>
-        <p:nvPicPr>
-          <p:cNvPr id="26" name="Graphic 13">
-            <a:extLst>
-              <a:ext uri="{FF2B5EF4-FFF2-40B4-BE49-F238E27FC236}">
-                <a16:creationId xmlns:a16="http://schemas.microsoft.com/office/drawing/2014/main" id="{0700CE9F-3CA3-2FCC-5254-DABB21C93670}"/>
-              </a:ext>
-            </a:extLst>
-          </p:cNvPr>
-          <p:cNvPicPr>
-            <a:picLocks noChangeAspect="1" noChangeArrowheads="1"/>
-          </p:cNvPicPr>
-          <p:nvPr/>
-        </p:nvPicPr>
-        <p:blipFill>
-          <a:blip r:embed="rId6">
-            <a:extLst>
-              <a:ext uri="{28A0092B-C50C-407E-A947-70E740481C1C}">
-                <a14:useLocalDpi xmlns:a14="http://schemas.microsoft.com/office/drawing/2010/main" val="0"/>
-              </a:ext>
-            </a:extLst>
-          </a:blip>
-          <a:srcRect/>
-          <a:stretch>
-            <a:fillRect/>
-          </a:stretch>
-        </p:blipFill>
-        <p:spPr bwMode="auto">
-          <a:xfrm>
-            <a:off x="5237871" y="2042070"/>
-            <a:ext cx="457200" cy="457200"/>
-          </a:xfrm>
-          <a:prstGeom prst="rect">
-            <a:avLst/>
-          </a:prstGeom>
-          <a:noFill/>
-          <a:ln>
-            <a:noFill/>
-          </a:ln>
-          <a:extLst>
-            <a:ext uri="{909E8E84-426E-40DD-AFC4-6F175D3DCCD1}">
-              <a14:hiddenFill xmlns:a14="http://schemas.microsoft.com/office/drawing/2010/main">
-                <a:solidFill>
-                  <a:srgbClr val="FFFFFF"/>
-                </a:solidFill>
-              </a14:hiddenFill>
-            </a:ext>
-            <a:ext uri="{91240B29-F687-4F45-9708-019B960494DF}">
-              <a14:hiddenLine xmlns:a14="http://schemas.microsoft.com/office/drawing/2010/main" w="9525">
-                <a:solidFill>
-                  <a:srgbClr val="000000"/>
-                </a:solidFill>
-                <a:miter lim="800000"/>
-                <a:headEnd/>
-                <a:tailEnd/>
-              </a14:hiddenLine>
-            </a:ext>
-          </a:extLst>
-        </p:spPr>
-      </p:pic>
-      <p:pic>
-        <p:nvPicPr>
-          <p:cNvPr id="47" name="Graphic 19">
-            <a:extLst>
-              <a:ext uri="{FF2B5EF4-FFF2-40B4-BE49-F238E27FC236}">
-                <a16:creationId xmlns:a16="http://schemas.microsoft.com/office/drawing/2014/main" id="{893068EF-6B6A-49AF-DC1F-30D2D94D73D7}"/>
-              </a:ext>
-            </a:extLst>
-          </p:cNvPr>
-          <p:cNvPicPr>
-            <a:picLocks noChangeAspect="1" noChangeArrowheads="1"/>
-          </p:cNvPicPr>
-          <p:nvPr/>
-        </p:nvPicPr>
-        <p:blipFill>
-          <a:blip r:embed="rId12">
-            <a:extLst>
-              <a:ext uri="{28A0092B-C50C-407E-A947-70E740481C1C}">
-                <a14:useLocalDpi xmlns:a14="http://schemas.microsoft.com/office/drawing/2010/main" val="0"/>
-              </a:ext>
-            </a:extLst>
-          </a:blip>
-          <a:srcRect/>
-          <a:stretch>
-            <a:fillRect/>
-          </a:stretch>
-        </p:blipFill>
-        <p:spPr bwMode="auto">
-          <a:xfrm>
-            <a:off x="7294689" y="792695"/>
-            <a:ext cx="762000" cy="762000"/>
-          </a:xfrm>
-          <a:prstGeom prst="rect">
-            <a:avLst/>
-          </a:prstGeom>
-          <a:noFill/>
-          <a:ln>
-            <a:noFill/>
-          </a:ln>
-          <a:extLst>
-            <a:ext uri="{909E8E84-426E-40DD-AFC4-6F175D3DCCD1}">
-              <a14:hiddenFill xmlns:a14="http://schemas.microsoft.com/office/drawing/2010/main">
-                <a:solidFill>
-                  <a:srgbClr val="FFFFFF"/>
-                </a:solidFill>
-              </a14:hiddenFill>
-            </a:ext>
-            <a:ext uri="{91240B29-F687-4F45-9708-019B960494DF}">
-              <a14:hiddenLine xmlns:a14="http://schemas.microsoft.com/office/drawing/2010/main" w="9525">
-                <a:solidFill>
-                  <a:srgbClr val="000000"/>
-                </a:solidFill>
-                <a:miter lim="800000"/>
-                <a:headEnd/>
-                <a:tailEnd/>
-              </a14:hiddenLine>
-            </a:ext>
-          </a:extLst>
         </p:spPr>
       </p:pic>
       <p:sp>
@@ -4385,7 +3842,7 @@
             </a:pathLst>
           </a:custGeom>
           <a:noFill/>
-          <a:ln w="12700">
+          <a:ln w="15875">
             <a:solidFill>
               <a:schemeClr val="tx2"/>
             </a:solidFill>
@@ -4443,7 +3900,7 @@
         <p:spPr bwMode="auto">
           <a:xfrm>
             <a:off x="1706660" y="1325880"/>
-            <a:ext cx="896162" cy="430887"/>
+            <a:ext cx="896162" cy="461665"/>
           </a:xfrm>
           <a:prstGeom prst="rect">
             <a:avLst/>
@@ -4577,7 +4034,7 @@
           <a:p>
             <a:pPr algn="ctr" eaLnBrk="1" hangingPunct="1"/>
             <a:r>
-              <a:rPr lang="en-US" altLang="en-US" sz="1100" dirty="0">
+              <a:rPr lang="en-US" altLang="en-US" sz="1200" dirty="0">
                 <a:latin typeface="Arial" panose="020B0604020202020204" pitchFamily="34" charset="0"/>
                 <a:ea typeface="Amazon Ember" panose="020B0603020204020204" pitchFamily="34" charset="0"/>
                 <a:cs typeface="Arial" panose="020B0604020202020204" pitchFamily="34" charset="0"/>
@@ -4585,14 +4042,14 @@
               <a:t>Readings</a:t>
             </a:r>
             <a:br>
-              <a:rPr lang="en-US" altLang="en-US" sz="1100" dirty="0">
+              <a:rPr lang="en-US" altLang="en-US" sz="1200" dirty="0">
                 <a:latin typeface="Arial" panose="020B0604020202020204" pitchFamily="34" charset="0"/>
                 <a:ea typeface="Amazon Ember" panose="020B0603020204020204" pitchFamily="34" charset="0"/>
                 <a:cs typeface="Arial" panose="020B0604020202020204" pitchFamily="34" charset="0"/>
               </a:rPr>
             </a:br>
             <a:r>
-              <a:rPr lang="en-US" altLang="en-US" sz="1100" dirty="0">
+              <a:rPr lang="en-US" altLang="en-US" sz="1200" dirty="0">
                 <a:latin typeface="Arial" panose="020B0604020202020204" pitchFamily="34" charset="0"/>
                 <a:ea typeface="Amazon Ember" panose="020B0603020204020204" pitchFamily="34" charset="0"/>
                 <a:cs typeface="Arial" panose="020B0604020202020204" pitchFamily="34" charset="0"/>
@@ -4602,182 +4059,6 @@
           </a:p>
         </p:txBody>
       </p:sp>
-      <p:pic>
-        <p:nvPicPr>
-          <p:cNvPr id="97" name="Graphic 6">
-            <a:extLst>
-              <a:ext uri="{FF2B5EF4-FFF2-40B4-BE49-F238E27FC236}">
-                <a16:creationId xmlns:a16="http://schemas.microsoft.com/office/drawing/2014/main" id="{38A26ED0-0391-2CE0-BB33-B629154BCE60}"/>
-              </a:ext>
-            </a:extLst>
-          </p:cNvPr>
-          <p:cNvPicPr>
-            <a:picLocks noChangeAspect="1" noChangeArrowheads="1"/>
-          </p:cNvPicPr>
-          <p:nvPr/>
-        </p:nvPicPr>
-        <p:blipFill>
-          <a:blip r:embed="rId13">
-            <a:extLst>
-              <a:ext uri="{96DAC541-7B7A-43D3-8B79-37D633B846F1}">
-                <asvg:svgBlip xmlns:asvg="http://schemas.microsoft.com/office/drawing/2016/SVG/main" r:embed="rId14"/>
-              </a:ext>
-            </a:extLst>
-          </a:blip>
-          <a:srcRect/>
-          <a:stretch/>
-        </p:blipFill>
-        <p:spPr bwMode="auto">
-          <a:xfrm>
-            <a:off x="1918314" y="2519715"/>
-            <a:ext cx="457200" cy="457200"/>
-          </a:xfrm>
-          <a:prstGeom prst="rect">
-            <a:avLst/>
-          </a:prstGeom>
-          <a:noFill/>
-          <a:ln>
-            <a:noFill/>
-          </a:ln>
-          <a:extLst>
-            <a:ext uri="{909E8E84-426E-40DD-AFC4-6F175D3DCCD1}">
-              <a14:hiddenFill xmlns:a14="http://schemas.microsoft.com/office/drawing/2010/main">
-                <a:solidFill>
-                  <a:srgbClr val="FFFFFF"/>
-                </a:solidFill>
-              </a14:hiddenFill>
-            </a:ext>
-            <a:ext uri="{91240B29-F687-4F45-9708-019B960494DF}">
-              <a14:hiddenLine xmlns:a14="http://schemas.microsoft.com/office/drawing/2010/main" w="9525">
-                <a:solidFill>
-                  <a:srgbClr val="000000"/>
-                </a:solidFill>
-                <a:miter lim="800000"/>
-                <a:headEnd/>
-                <a:tailEnd/>
-              </a14:hiddenLine>
-            </a:ext>
-          </a:extLst>
-        </p:spPr>
-      </p:pic>
-      <p:pic>
-        <p:nvPicPr>
-          <p:cNvPr id="103" name="Graphic 6">
-            <a:extLst>
-              <a:ext uri="{FF2B5EF4-FFF2-40B4-BE49-F238E27FC236}">
-                <a16:creationId xmlns:a16="http://schemas.microsoft.com/office/drawing/2014/main" id="{2B0224E1-FAB0-C3C7-27C0-AA137F791356}"/>
-              </a:ext>
-            </a:extLst>
-          </p:cNvPr>
-          <p:cNvPicPr>
-            <a:picLocks noChangeAspect="1" noChangeArrowheads="1"/>
-          </p:cNvPicPr>
-          <p:nvPr/>
-        </p:nvPicPr>
-        <p:blipFill>
-          <a:blip r:embed="rId13">
-            <a:extLst>
-              <a:ext uri="{96DAC541-7B7A-43D3-8B79-37D633B846F1}">
-                <asvg:svgBlip xmlns:asvg="http://schemas.microsoft.com/office/drawing/2016/SVG/main" r:embed="rId14"/>
-              </a:ext>
-            </a:extLst>
-          </a:blip>
-          <a:srcRect/>
-          <a:stretch/>
-        </p:blipFill>
-        <p:spPr bwMode="auto">
-          <a:xfrm>
-            <a:off x="1919792" y="914400"/>
-            <a:ext cx="457200" cy="457200"/>
-          </a:xfrm>
-          <a:prstGeom prst="rect">
-            <a:avLst/>
-          </a:prstGeom>
-          <a:noFill/>
-          <a:ln>
-            <a:noFill/>
-          </a:ln>
-          <a:extLst>
-            <a:ext uri="{909E8E84-426E-40DD-AFC4-6F175D3DCCD1}">
-              <a14:hiddenFill xmlns:a14="http://schemas.microsoft.com/office/drawing/2010/main">
-                <a:solidFill>
-                  <a:srgbClr val="FFFFFF"/>
-                </a:solidFill>
-              </a14:hiddenFill>
-            </a:ext>
-            <a:ext uri="{91240B29-F687-4F45-9708-019B960494DF}">
-              <a14:hiddenLine xmlns:a14="http://schemas.microsoft.com/office/drawing/2010/main" w="9525">
-                <a:solidFill>
-                  <a:srgbClr val="000000"/>
-                </a:solidFill>
-                <a:miter lim="800000"/>
-                <a:headEnd/>
-                <a:tailEnd/>
-              </a14:hiddenLine>
-            </a:ext>
-          </a:extLst>
-        </p:spPr>
-      </p:pic>
-      <p:pic>
-        <p:nvPicPr>
-          <p:cNvPr id="104" name="Graphic 13">
-            <a:extLst>
-              <a:ext uri="{FF2B5EF4-FFF2-40B4-BE49-F238E27FC236}">
-                <a16:creationId xmlns:a16="http://schemas.microsoft.com/office/drawing/2014/main" id="{887CCCCF-6D24-6A13-FE5B-F8CD56DA72D1}"/>
-              </a:ext>
-            </a:extLst>
-          </p:cNvPr>
-          <p:cNvPicPr>
-            <a:picLocks noChangeAspect="1" noChangeArrowheads="1"/>
-          </p:cNvPicPr>
-          <p:nvPr/>
-        </p:nvPicPr>
-        <p:blipFill>
-          <a:blip r:embed="rId6">
-            <a:extLst>
-              <a:ext uri="{28A0092B-C50C-407E-A947-70E740481C1C}">
-                <a14:useLocalDpi xmlns:a14="http://schemas.microsoft.com/office/drawing/2010/main" val="0"/>
-              </a:ext>
-            </a:extLst>
-          </a:blip>
-          <a:srcRect/>
-          <a:stretch>
-            <a:fillRect/>
-          </a:stretch>
-        </p:blipFill>
-        <p:spPr bwMode="auto">
-          <a:xfrm>
-            <a:off x="3017520" y="914400"/>
-            <a:ext cx="457200" cy="457200"/>
-          </a:xfrm>
-          <a:prstGeom prst="rect">
-            <a:avLst/>
-          </a:prstGeom>
-          <a:noFill/>
-          <a:ln>
-            <a:noFill/>
-          </a:ln>
-          <a:extLst>
-            <a:ext uri="{909E8E84-426E-40DD-AFC4-6F175D3DCCD1}">
-              <a14:hiddenFill xmlns:a14="http://schemas.microsoft.com/office/drawing/2010/main">
-                <a:solidFill>
-                  <a:srgbClr val="FFFFFF"/>
-                </a:solidFill>
-              </a14:hiddenFill>
-            </a:ext>
-            <a:ext uri="{91240B29-F687-4F45-9708-019B960494DF}">
-              <a14:hiddenLine xmlns:a14="http://schemas.microsoft.com/office/drawing/2010/main" w="9525">
-                <a:solidFill>
-                  <a:srgbClr val="000000"/>
-                </a:solidFill>
-                <a:miter lim="800000"/>
-                <a:headEnd/>
-                <a:tailEnd/>
-              </a14:hiddenLine>
-            </a:ext>
-          </a:extLst>
-        </p:spPr>
-      </p:pic>
       <p:cxnSp>
         <p:nvCxnSpPr>
           <p:cNvPr id="105" name="Straight Arrow Connector 104">
@@ -4789,8 +4070,6 @@
           </p:cNvPr>
           <p:cNvCxnSpPr>
             <a:cxnSpLocks/>
-            <a:stCxn id="103" idx="3"/>
-            <a:endCxn id="104" idx="1"/>
           </p:cNvCxnSpPr>
           <p:nvPr/>
         </p:nvCxnSpPr>
@@ -4802,7 +4081,7 @@
           <a:prstGeom prst="straightConnector1">
             <a:avLst/>
           </a:prstGeom>
-          <a:ln w="12700">
+          <a:ln w="15875">
             <a:solidFill>
               <a:schemeClr val="tx2"/>
             </a:solidFill>
@@ -4841,8 +4120,8 @@
         </p:nvSpPr>
         <p:spPr bwMode="auto">
           <a:xfrm>
-            <a:off x="1642189" y="2926080"/>
-            <a:ext cx="1005840" cy="261610"/>
+            <a:off x="1599752" y="2926080"/>
+            <a:ext cx="1097280" cy="274320"/>
           </a:xfrm>
           <a:prstGeom prst="rect">
             <a:avLst/>
@@ -4976,7 +4255,7 @@
           <a:p>
             <a:pPr algn="ctr" eaLnBrk="1" hangingPunct="1"/>
             <a:r>
-              <a:rPr lang="en-US" altLang="en-US" sz="1100" dirty="0">
+              <a:rPr lang="en-US" altLang="en-US" sz="1200" dirty="0">
                 <a:latin typeface="Arial" panose="020B0604020202020204" pitchFamily="34" charset="0"/>
                 <a:ea typeface="Amazon Ember" panose="020B0603020204020204" pitchFamily="34" charset="0"/>
                 <a:cs typeface="Arial" panose="020B0604020202020204" pitchFamily="34" charset="0"/>
@@ -5003,7 +4282,7 @@
         <p:spPr bwMode="auto">
           <a:xfrm>
             <a:off x="2771750" y="1325880"/>
-            <a:ext cx="989953" cy="430887"/>
+            <a:ext cx="989953" cy="461665"/>
           </a:xfrm>
           <a:prstGeom prst="rect">
             <a:avLst/>
@@ -5137,7 +4416,7 @@
           <a:p>
             <a:pPr algn="ctr" eaLnBrk="1" hangingPunct="1"/>
             <a:r>
-              <a:rPr lang="en-US" altLang="en-US" sz="1100" dirty="0">
+              <a:rPr lang="en-US" altLang="en-US" sz="1200" dirty="0">
                 <a:latin typeface="Arial" panose="020B0604020202020204" pitchFamily="34" charset="0"/>
                 <a:ea typeface="Amazon Ember" panose="020B0603020204020204" pitchFamily="34" charset="0"/>
                 <a:cs typeface="Arial" panose="020B0604020202020204" pitchFamily="34" charset="0"/>
@@ -5145,14 +4424,14 @@
               <a:t>Paginated</a:t>
             </a:r>
             <a:br>
-              <a:rPr lang="en-US" altLang="en-US" sz="1100" dirty="0">
+              <a:rPr lang="en-US" altLang="en-US" sz="1200" dirty="0">
                 <a:latin typeface="Arial" panose="020B0604020202020204" pitchFamily="34" charset="0"/>
                 <a:ea typeface="Amazon Ember" panose="020B0603020204020204" pitchFamily="34" charset="0"/>
                 <a:cs typeface="Arial" panose="020B0604020202020204" pitchFamily="34" charset="0"/>
               </a:rPr>
             </a:br>
             <a:r>
-              <a:rPr lang="en-US" altLang="en-US" sz="1100" dirty="0">
+              <a:rPr lang="en-US" altLang="en-US" sz="1200" dirty="0">
                 <a:latin typeface="Arial" panose="020B0604020202020204" pitchFamily="34" charset="0"/>
                 <a:ea typeface="Amazon Ember" panose="020B0603020204020204" pitchFamily="34" charset="0"/>
                 <a:cs typeface="Arial" panose="020B0604020202020204" pitchFamily="34" charset="0"/>
@@ -5179,7 +4458,7 @@
         <p:spPr bwMode="auto">
           <a:xfrm>
             <a:off x="2738876" y="2514211"/>
-            <a:ext cx="1005840" cy="261610"/>
+            <a:ext cx="1005840" cy="276999"/>
           </a:xfrm>
           <a:prstGeom prst="rect">
             <a:avLst/>
@@ -5313,7 +4592,7 @@
           <a:p>
             <a:pPr algn="ctr" eaLnBrk="1" hangingPunct="1"/>
             <a:r>
-              <a:rPr lang="en-US" altLang="en-US" sz="1100" dirty="0">
+              <a:rPr lang="en-US" altLang="en-US" sz="1200" dirty="0">
                 <a:latin typeface="Arial" panose="020B0604020202020204" pitchFamily="34" charset="0"/>
                 <a:ea typeface="Amazon Ember" panose="020B0603020204020204" pitchFamily="34" charset="0"/>
                 <a:cs typeface="Arial" panose="020B0604020202020204" pitchFamily="34" charset="0"/>
@@ -5339,8 +4618,8 @@
         </p:nvSpPr>
         <p:spPr bwMode="auto">
           <a:xfrm>
-            <a:off x="2846407" y="3429000"/>
-            <a:ext cx="822960" cy="274320"/>
+            <a:off x="2782748" y="3447288"/>
+            <a:ext cx="914400" cy="274320"/>
           </a:xfrm>
           <a:prstGeom prst="rect">
             <a:avLst/>
@@ -5474,7 +4753,7 @@
           <a:p>
             <a:pPr algn="ctr" eaLnBrk="1" hangingPunct="1"/>
             <a:r>
-              <a:rPr lang="en-US" altLang="en-US" sz="1100" dirty="0">
+              <a:rPr lang="en-US" altLang="en-US" sz="1200" dirty="0">
                 <a:latin typeface="Arial" panose="020B0604020202020204" pitchFamily="34" charset="0"/>
                 <a:ea typeface="Amazon Ember" panose="020B0603020204020204" pitchFamily="34" charset="0"/>
                 <a:cs typeface="Arial" panose="020B0604020202020204" pitchFamily="34" charset="0"/>
@@ -5635,7 +4914,7 @@
           <a:p>
             <a:pPr algn="ctr" eaLnBrk="1" hangingPunct="1"/>
             <a:r>
-              <a:rPr lang="en-US" altLang="en-US" sz="1100" dirty="0">
+              <a:rPr lang="en-US" altLang="en-US" sz="1200" dirty="0">
                 <a:latin typeface="Arial" panose="020B0604020202020204" pitchFamily="34" charset="0"/>
                 <a:ea typeface="Amazon Ember" panose="020B0603020204020204" pitchFamily="34" charset="0"/>
                 <a:cs typeface="Arial" panose="020B0604020202020204" pitchFamily="34" charset="0"/>
@@ -5661,8 +4940,8 @@
         </p:nvSpPr>
         <p:spPr bwMode="auto">
           <a:xfrm>
-            <a:off x="5015533" y="2423160"/>
-            <a:ext cx="914400" cy="274320"/>
+            <a:off x="4959075" y="2441448"/>
+            <a:ext cx="1005840" cy="274320"/>
           </a:xfrm>
           <a:prstGeom prst="rect">
             <a:avLst/>
@@ -5796,7 +5075,7 @@
           <a:p>
             <a:pPr algn="ctr" eaLnBrk="1" hangingPunct="1"/>
             <a:r>
-              <a:rPr lang="en-US" altLang="en-US" sz="1100" dirty="0">
+              <a:rPr lang="en-US" altLang="en-US" sz="1200" dirty="0">
                 <a:latin typeface="Arial" panose="020B0604020202020204" pitchFamily="34" charset="0"/>
                 <a:ea typeface="Amazon Ember" panose="020B0603020204020204" pitchFamily="34" charset="0"/>
                 <a:cs typeface="Arial" panose="020B0604020202020204" pitchFamily="34" charset="0"/>
@@ -5967,248 +5246,167 @@
           </a:p>
         </p:txBody>
       </p:sp>
-      <p:grpSp>
-        <p:nvGrpSpPr>
-          <p:cNvPr id="10" name="Group 9">
-            <a:extLst>
-              <a:ext uri="{FF2B5EF4-FFF2-40B4-BE49-F238E27FC236}">
-                <a16:creationId xmlns:a16="http://schemas.microsoft.com/office/drawing/2014/main" id="{373BEF54-4264-452E-B06A-348B44601D63}"/>
-              </a:ext>
-            </a:extLst>
-          </p:cNvPr>
-          <p:cNvGrpSpPr/>
+      <p:sp>
+        <p:nvSpPr>
+          <p:cNvPr id="156" name="TextBox 9">
+            <a:extLst>
+              <a:ext uri="{FF2B5EF4-FFF2-40B4-BE49-F238E27FC236}">
+                <a16:creationId xmlns:a16="http://schemas.microsoft.com/office/drawing/2014/main" id="{65CA9F73-673A-BE10-3743-34AF774D0B03}"/>
+              </a:ext>
+            </a:extLst>
+          </p:cNvPr>
+          <p:cNvSpPr txBox="1">
+            <a:spLocks noChangeArrowheads="1"/>
+          </p:cNvSpPr>
           <p:nvPr/>
-        </p:nvGrpSpPr>
-        <p:grpSpPr>
+        </p:nvSpPr>
+        <p:spPr bwMode="auto">
           <a:xfrm>
-            <a:off x="7376476" y="3474720"/>
-            <a:ext cx="1737360" cy="1054239"/>
-            <a:chOff x="7376476" y="3931920"/>
-            <a:chExt cx="1737360" cy="1054239"/>
+            <a:off x="7376476" y="4251960"/>
+            <a:ext cx="1737360" cy="276999"/>
           </a:xfrm>
-        </p:grpSpPr>
-        <p:pic>
-          <p:nvPicPr>
-            <p:cNvPr id="5" name="Graphic 17">
-              <a:extLst>
-                <a:ext uri="{FF2B5EF4-FFF2-40B4-BE49-F238E27FC236}">
-                  <a16:creationId xmlns:a16="http://schemas.microsoft.com/office/drawing/2014/main" id="{D5AA282D-9F86-91C1-4703-7B88A64161F6}"/>
-                </a:ext>
-              </a:extLst>
-            </p:cNvPr>
-            <p:cNvPicPr>
-              <a:picLocks noChangeAspect="1" noChangeArrowheads="1"/>
-            </p:cNvPicPr>
-            <p:nvPr/>
-          </p:nvPicPr>
-          <p:blipFill>
-            <a:blip r:embed="rId15">
-              <a:extLst>
-                <a:ext uri="{28A0092B-C50C-407E-A947-70E740481C1C}">
-                  <a14:useLocalDpi xmlns:a14="http://schemas.microsoft.com/office/drawing/2010/main" val="0"/>
-                </a:ext>
-              </a:extLst>
-            </a:blip>
-            <a:srcRect/>
-            <a:stretch>
-              <a:fillRect/>
-            </a:stretch>
-          </p:blipFill>
-          <p:spPr bwMode="auto">
-            <a:xfrm>
-              <a:off x="7864156" y="3931920"/>
-              <a:ext cx="762000" cy="762000"/>
-            </a:xfrm>
-            <a:prstGeom prst="rect">
-              <a:avLst/>
-            </a:prstGeom>
+          <a:prstGeom prst="rect">
+            <a:avLst/>
+          </a:prstGeom>
+          <a:noFill/>
+          <a:ln>
             <a:noFill/>
-            <a:ln>
-              <a:noFill/>
-            </a:ln>
-            <a:extLst>
-              <a:ext uri="{909E8E84-426E-40DD-AFC4-6F175D3DCCD1}">
-                <a14:hiddenFill xmlns:a14="http://schemas.microsoft.com/office/drawing/2010/main">
-                  <a:solidFill>
-                    <a:srgbClr val="FFFFFF"/>
-                  </a:solidFill>
-                </a14:hiddenFill>
-              </a:ext>
-              <a:ext uri="{91240B29-F687-4F45-9708-019B960494DF}">
-                <a14:hiddenLine xmlns:a14="http://schemas.microsoft.com/office/drawing/2010/main" w="9525">
-                  <a:solidFill>
-                    <a:srgbClr val="000000"/>
-                  </a:solidFill>
-                  <a:miter lim="800000"/>
-                  <a:headEnd/>
-                  <a:tailEnd/>
-                </a14:hiddenLine>
-              </a:ext>
-            </a:extLst>
-          </p:spPr>
-        </p:pic>
-        <p:sp>
-          <p:nvSpPr>
-            <p:cNvPr id="156" name="TextBox 9">
-              <a:extLst>
-                <a:ext uri="{FF2B5EF4-FFF2-40B4-BE49-F238E27FC236}">
-                  <a16:creationId xmlns:a16="http://schemas.microsoft.com/office/drawing/2014/main" id="{65CA9F73-673A-BE10-3743-34AF774D0B03}"/>
-                </a:ext>
-              </a:extLst>
-            </p:cNvPr>
-            <p:cNvSpPr txBox="1">
-              <a:spLocks noChangeArrowheads="1"/>
-            </p:cNvSpPr>
-            <p:nvPr/>
-          </p:nvSpPr>
-          <p:spPr bwMode="auto">
-            <a:xfrm>
-              <a:off x="7376476" y="4709160"/>
-              <a:ext cx="1737360" cy="276999"/>
-            </a:xfrm>
-            <a:prstGeom prst="rect">
-              <a:avLst/>
-            </a:prstGeom>
-            <a:noFill/>
-            <a:ln>
-              <a:noFill/>
-            </a:ln>
-            <a:extLst>
-              <a:ext uri="{909E8E84-426E-40DD-AFC4-6F175D3DCCD1}">
-                <a14:hiddenFill xmlns:a14="http://schemas.microsoft.com/office/drawing/2010/main">
-                  <a:solidFill>
-                    <a:srgbClr val="FFFFFF"/>
-                  </a:solidFill>
-                </a14:hiddenFill>
-              </a:ext>
-              <a:ext uri="{91240B29-F687-4F45-9708-019B960494DF}">
-                <a14:hiddenLine xmlns:a14="http://schemas.microsoft.com/office/drawing/2010/main" w="9525">
-                  <a:solidFill>
-                    <a:srgbClr val="000000"/>
-                  </a:solidFill>
-                  <a:miter lim="800000"/>
-                  <a:headEnd/>
-                  <a:tailEnd/>
-                </a14:hiddenLine>
-              </a:ext>
-            </a:extLst>
-          </p:spPr>
-          <p:txBody>
-            <a:bodyPr wrap="square">
-              <a:spAutoFit/>
-            </a:bodyPr>
-            <a:lstStyle>
-              <a:lvl1pPr>
-                <a:defRPr>
-                  <a:solidFill>
-                    <a:schemeClr val="tx1"/>
-                  </a:solidFill>
-                  <a:latin typeface="Calibri" panose="020F0502020204030204" pitchFamily="34" charset="0"/>
-                </a:defRPr>
-              </a:lvl1pPr>
-              <a:lvl2pPr marL="742950" indent="-285750">
-                <a:defRPr>
-                  <a:solidFill>
-                    <a:schemeClr val="tx1"/>
-                  </a:solidFill>
-                  <a:latin typeface="Calibri" panose="020F0502020204030204" pitchFamily="34" charset="0"/>
-                </a:defRPr>
-              </a:lvl2pPr>
-              <a:lvl3pPr marL="1143000" indent="-228600">
-                <a:defRPr>
-                  <a:solidFill>
-                    <a:schemeClr val="tx1"/>
-                  </a:solidFill>
-                  <a:latin typeface="Calibri" panose="020F0502020204030204" pitchFamily="34" charset="0"/>
-                </a:defRPr>
-              </a:lvl3pPr>
-              <a:lvl4pPr marL="1600200" indent="-228600">
-                <a:defRPr>
-                  <a:solidFill>
-                    <a:schemeClr val="tx1"/>
-                  </a:solidFill>
-                  <a:latin typeface="Calibri" panose="020F0502020204030204" pitchFamily="34" charset="0"/>
-                </a:defRPr>
-              </a:lvl4pPr>
-              <a:lvl5pPr marL="2057400" indent="-228600">
-                <a:defRPr>
-                  <a:solidFill>
-                    <a:schemeClr val="tx1"/>
-                  </a:solidFill>
-                  <a:latin typeface="Calibri" panose="020F0502020204030204" pitchFamily="34" charset="0"/>
-                </a:defRPr>
-              </a:lvl5pPr>
-              <a:lvl6pPr marL="2514600" indent="-228600" eaLnBrk="0" fontAlgn="base" hangingPunct="0">
-                <a:spcBef>
-                  <a:spcPct val="0"/>
-                </a:spcBef>
-                <a:spcAft>
-                  <a:spcPct val="0"/>
-                </a:spcAft>
-                <a:defRPr>
-                  <a:solidFill>
-                    <a:schemeClr val="tx1"/>
-                  </a:solidFill>
-                  <a:latin typeface="Calibri" panose="020F0502020204030204" pitchFamily="34" charset="0"/>
-                </a:defRPr>
-              </a:lvl6pPr>
-              <a:lvl7pPr marL="2971800" indent="-228600" eaLnBrk="0" fontAlgn="base" hangingPunct="0">
-                <a:spcBef>
-                  <a:spcPct val="0"/>
-                </a:spcBef>
-                <a:spcAft>
-                  <a:spcPct val="0"/>
-                </a:spcAft>
-                <a:defRPr>
-                  <a:solidFill>
-                    <a:schemeClr val="tx1"/>
-                  </a:solidFill>
-                  <a:latin typeface="Calibri" panose="020F0502020204030204" pitchFamily="34" charset="0"/>
-                </a:defRPr>
-              </a:lvl7pPr>
-              <a:lvl8pPr marL="3429000" indent="-228600" eaLnBrk="0" fontAlgn="base" hangingPunct="0">
-                <a:spcBef>
-                  <a:spcPct val="0"/>
-                </a:spcBef>
-                <a:spcAft>
-                  <a:spcPct val="0"/>
-                </a:spcAft>
-                <a:defRPr>
-                  <a:solidFill>
-                    <a:schemeClr val="tx1"/>
-                  </a:solidFill>
-                  <a:latin typeface="Calibri" panose="020F0502020204030204" pitchFamily="34" charset="0"/>
-                </a:defRPr>
-              </a:lvl8pPr>
-              <a:lvl9pPr marL="3886200" indent="-228600" eaLnBrk="0" fontAlgn="base" hangingPunct="0">
-                <a:spcBef>
-                  <a:spcPct val="0"/>
-                </a:spcBef>
-                <a:spcAft>
-                  <a:spcPct val="0"/>
-                </a:spcAft>
-                <a:defRPr>
-                  <a:solidFill>
-                    <a:schemeClr val="tx1"/>
-                  </a:solidFill>
-                  <a:latin typeface="Calibri" panose="020F0502020204030204" pitchFamily="34" charset="0"/>
-                </a:defRPr>
-              </a:lvl9pPr>
-            </a:lstStyle>
-            <a:p>
-              <a:pPr algn="ctr" eaLnBrk="1" hangingPunct="1"/>
-              <a:r>
-                <a:rPr lang="en-US" altLang="en-US" sz="1200" dirty="0">
-                  <a:latin typeface="Arial" panose="020B0604020202020204" pitchFamily="34" charset="0"/>
-                  <a:ea typeface="Amazon Ember" panose="020B0603020204020204" pitchFamily="34" charset="0"/>
-                  <a:cs typeface="Arial" panose="020B0604020202020204" pitchFamily="34" charset="0"/>
-                </a:rPr>
-                <a:t>AWS Secrets Manager</a:t>
-              </a:r>
-            </a:p>
-          </p:txBody>
-        </p:sp>
-      </p:grpSp>
+          </a:ln>
+          <a:extLst>
+            <a:ext uri="{909E8E84-426E-40DD-AFC4-6F175D3DCCD1}">
+              <a14:hiddenFill xmlns:a14="http://schemas.microsoft.com/office/drawing/2010/main">
+                <a:solidFill>
+                  <a:srgbClr val="FFFFFF"/>
+                </a:solidFill>
+              </a14:hiddenFill>
+            </a:ext>
+            <a:ext uri="{91240B29-F687-4F45-9708-019B960494DF}">
+              <a14:hiddenLine xmlns:a14="http://schemas.microsoft.com/office/drawing/2010/main" w="9525">
+                <a:solidFill>
+                  <a:srgbClr val="000000"/>
+                </a:solidFill>
+                <a:miter lim="800000"/>
+                <a:headEnd/>
+                <a:tailEnd/>
+              </a14:hiddenLine>
+            </a:ext>
+          </a:extLst>
+        </p:spPr>
+        <p:txBody>
+          <a:bodyPr wrap="square">
+            <a:spAutoFit/>
+          </a:bodyPr>
+          <a:lstStyle>
+            <a:lvl1pPr>
+              <a:defRPr>
+                <a:solidFill>
+                  <a:schemeClr val="tx1"/>
+                </a:solidFill>
+                <a:latin typeface="Calibri" panose="020F0502020204030204" pitchFamily="34" charset="0"/>
+              </a:defRPr>
+            </a:lvl1pPr>
+            <a:lvl2pPr marL="742950" indent="-285750">
+              <a:defRPr>
+                <a:solidFill>
+                  <a:schemeClr val="tx1"/>
+                </a:solidFill>
+                <a:latin typeface="Calibri" panose="020F0502020204030204" pitchFamily="34" charset="0"/>
+              </a:defRPr>
+            </a:lvl2pPr>
+            <a:lvl3pPr marL="1143000" indent="-228600">
+              <a:defRPr>
+                <a:solidFill>
+                  <a:schemeClr val="tx1"/>
+                </a:solidFill>
+                <a:latin typeface="Calibri" panose="020F0502020204030204" pitchFamily="34" charset="0"/>
+              </a:defRPr>
+            </a:lvl3pPr>
+            <a:lvl4pPr marL="1600200" indent="-228600">
+              <a:defRPr>
+                <a:solidFill>
+                  <a:schemeClr val="tx1"/>
+                </a:solidFill>
+                <a:latin typeface="Calibri" panose="020F0502020204030204" pitchFamily="34" charset="0"/>
+              </a:defRPr>
+            </a:lvl4pPr>
+            <a:lvl5pPr marL="2057400" indent="-228600">
+              <a:defRPr>
+                <a:solidFill>
+                  <a:schemeClr val="tx1"/>
+                </a:solidFill>
+                <a:latin typeface="Calibri" panose="020F0502020204030204" pitchFamily="34" charset="0"/>
+              </a:defRPr>
+            </a:lvl5pPr>
+            <a:lvl6pPr marL="2514600" indent="-228600" eaLnBrk="0" fontAlgn="base" hangingPunct="0">
+              <a:spcBef>
+                <a:spcPct val="0"/>
+              </a:spcBef>
+              <a:spcAft>
+                <a:spcPct val="0"/>
+              </a:spcAft>
+              <a:defRPr>
+                <a:solidFill>
+                  <a:schemeClr val="tx1"/>
+                </a:solidFill>
+                <a:latin typeface="Calibri" panose="020F0502020204030204" pitchFamily="34" charset="0"/>
+              </a:defRPr>
+            </a:lvl6pPr>
+            <a:lvl7pPr marL="2971800" indent="-228600" eaLnBrk="0" fontAlgn="base" hangingPunct="0">
+              <a:spcBef>
+                <a:spcPct val="0"/>
+              </a:spcBef>
+              <a:spcAft>
+                <a:spcPct val="0"/>
+              </a:spcAft>
+              <a:defRPr>
+                <a:solidFill>
+                  <a:schemeClr val="tx1"/>
+                </a:solidFill>
+                <a:latin typeface="Calibri" panose="020F0502020204030204" pitchFamily="34" charset="0"/>
+              </a:defRPr>
+            </a:lvl7pPr>
+            <a:lvl8pPr marL="3429000" indent="-228600" eaLnBrk="0" fontAlgn="base" hangingPunct="0">
+              <a:spcBef>
+                <a:spcPct val="0"/>
+              </a:spcBef>
+              <a:spcAft>
+                <a:spcPct val="0"/>
+              </a:spcAft>
+              <a:defRPr>
+                <a:solidFill>
+                  <a:schemeClr val="tx1"/>
+                </a:solidFill>
+                <a:latin typeface="Calibri" panose="020F0502020204030204" pitchFamily="34" charset="0"/>
+              </a:defRPr>
+            </a:lvl8pPr>
+            <a:lvl9pPr marL="3886200" indent="-228600" eaLnBrk="0" fontAlgn="base" hangingPunct="0">
+              <a:spcBef>
+                <a:spcPct val="0"/>
+              </a:spcBef>
+              <a:spcAft>
+                <a:spcPct val="0"/>
+              </a:spcAft>
+              <a:defRPr>
+                <a:solidFill>
+                  <a:schemeClr val="tx1"/>
+                </a:solidFill>
+                <a:latin typeface="Calibri" panose="020F0502020204030204" pitchFamily="34" charset="0"/>
+              </a:defRPr>
+            </a:lvl9pPr>
+          </a:lstStyle>
+          <a:p>
+            <a:pPr algn="ctr" eaLnBrk="1" hangingPunct="1"/>
+            <a:r>
+              <a:rPr lang="en-US" altLang="en-US" sz="1200" dirty="0">
+                <a:latin typeface="Arial" panose="020B0604020202020204" pitchFamily="34" charset="0"/>
+                <a:ea typeface="Amazon Ember" panose="020B0603020204020204" pitchFamily="34" charset="0"/>
+                <a:cs typeface="Arial" panose="020B0604020202020204" pitchFamily="34" charset="0"/>
+              </a:rPr>
+              <a:t>AWS Secrets Manager</a:t>
+            </a:r>
+          </a:p>
+        </p:txBody>
+      </p:sp>
       <p:sp>
         <p:nvSpPr>
           <p:cNvPr id="157" name="TextBox 9">
@@ -6387,7 +5585,7 @@
         <p:spPr bwMode="auto">
           <a:xfrm>
             <a:off x="4018355" y="2971800"/>
-            <a:ext cx="914400" cy="261610"/>
+            <a:ext cx="914400" cy="276999"/>
           </a:xfrm>
           <a:prstGeom prst="rect">
             <a:avLst/>
@@ -6521,7 +5719,7 @@
           <a:p>
             <a:pPr algn="ctr" eaLnBrk="1" hangingPunct="1"/>
             <a:r>
-              <a:rPr lang="en-US" altLang="en-US" sz="1100" dirty="0">
+              <a:rPr lang="en-US" altLang="en-US" sz="1200" dirty="0">
                 <a:latin typeface="Arial" panose="020B0604020202020204" pitchFamily="34" charset="0"/>
                 <a:ea typeface="Amazon Ember" panose="020B0603020204020204" pitchFamily="34" charset="0"/>
                 <a:cs typeface="Arial" panose="020B0604020202020204" pitchFamily="34" charset="0"/>
@@ -6542,8 +5740,6 @@
           </p:cNvPr>
           <p:cNvCxnSpPr>
             <a:cxnSpLocks/>
-            <a:stCxn id="6" idx="1"/>
-            <a:endCxn id="9" idx="3"/>
           </p:cNvCxnSpPr>
           <p:nvPr/>
         </p:nvCxnSpPr>
@@ -6555,7 +5751,7 @@
           <a:prstGeom prst="straightConnector1">
             <a:avLst/>
           </a:prstGeom>
-          <a:ln w="12700">
+          <a:ln w="15875">
             <a:solidFill>
               <a:schemeClr val="tx2"/>
             </a:solidFill>
@@ -6594,8 +5790,8 @@
         </p:nvSpPr>
         <p:spPr bwMode="auto">
           <a:xfrm>
-            <a:off x="3778206" y="4566680"/>
-            <a:ext cx="1196552" cy="261610"/>
+            <a:off x="3778206" y="4617720"/>
+            <a:ext cx="1196552" cy="276999"/>
           </a:xfrm>
           <a:prstGeom prst="rect">
             <a:avLst/>
@@ -6729,7 +5925,7 @@
           <a:p>
             <a:pPr algn="ctr" eaLnBrk="1" hangingPunct="1"/>
             <a:r>
-              <a:rPr lang="en-US" altLang="en-US" sz="1100" dirty="0">
+              <a:rPr lang="en-US" altLang="en-US" sz="1200" dirty="0">
                 <a:latin typeface="Arial" panose="020B0604020202020204" pitchFamily="34" charset="0"/>
                 <a:ea typeface="Amazon Ember" panose="020B0603020204020204" pitchFamily="34" charset="0"/>
                 <a:cs typeface="Arial" panose="020B0604020202020204" pitchFamily="34" charset="0"/>
@@ -6755,8 +5951,8 @@
         </p:nvSpPr>
         <p:spPr bwMode="auto">
           <a:xfrm>
-            <a:off x="1568589" y="4608537"/>
-            <a:ext cx="1196552" cy="261610"/>
+            <a:off x="1514661" y="4617720"/>
+            <a:ext cx="1280160" cy="274320"/>
           </a:xfrm>
           <a:prstGeom prst="rect">
             <a:avLst/>
@@ -6890,7 +6086,7 @@
           <a:p>
             <a:pPr algn="ctr" eaLnBrk="1" hangingPunct="1"/>
             <a:r>
-              <a:rPr lang="en-US" altLang="en-US" sz="1100" dirty="0">
+              <a:rPr lang="en-US" altLang="en-US" sz="1200" dirty="0">
                 <a:latin typeface="Arial" panose="020B0604020202020204" pitchFamily="34" charset="0"/>
                 <a:ea typeface="Amazon Ember" panose="020B0603020204020204" pitchFamily="34" charset="0"/>
                 <a:cs typeface="Arial" panose="020B0604020202020204" pitchFamily="34" charset="0"/>
@@ -6915,7 +6111,7 @@
           <p:nvPr/>
         </p:nvPicPr>
         <p:blipFill>
-          <a:blip r:embed="rId16">
+          <a:blip r:embed="rId6">
             <a:extLst>
               <a:ext uri="{28A0092B-C50C-407E-A947-70E740481C1C}">
                 <a14:useLocalDpi xmlns:a14="http://schemas.microsoft.com/office/drawing/2010/main" val="0"/>
@@ -6930,7 +6126,7 @@
         <p:spPr bwMode="auto">
           <a:xfrm>
             <a:off x="9692191" y="938745"/>
-            <a:ext cx="469900" cy="469900"/>
+            <a:ext cx="457200" cy="457200"/>
           </a:xfrm>
           <a:prstGeom prst="rect">
             <a:avLst/>
@@ -6976,8 +6172,8 @@
         </p:nvSpPr>
         <p:spPr bwMode="auto">
           <a:xfrm>
-            <a:off x="9424221" y="1391920"/>
-            <a:ext cx="1005840" cy="365760"/>
+            <a:off x="9378501" y="1389888"/>
+            <a:ext cx="1097280" cy="457200"/>
           </a:xfrm>
           <a:prstGeom prst="rect">
             <a:avLst/>
@@ -7111,7 +6307,7 @@
           <a:p>
             <a:pPr algn="ctr" eaLnBrk="1" hangingPunct="1"/>
             <a:r>
-              <a:rPr lang="en-US" altLang="en-US" sz="1100" dirty="0">
+              <a:rPr lang="en-US" altLang="en-US" sz="1200" dirty="0">
                 <a:solidFill>
                   <a:srgbClr val="000000"/>
                 </a:solidFill>
@@ -7135,19 +6331,18 @@
           <p:cNvCxnSpPr>
             <a:cxnSpLocks/>
             <a:stCxn id="13" idx="3"/>
-            <a:endCxn id="97" idx="1"/>
           </p:cNvCxnSpPr>
           <p:nvPr/>
         </p:nvCxnSpPr>
         <p:spPr>
-          <a:xfrm flipV="1">
-            <a:off x="935990" y="2748315"/>
-            <a:ext cx="982324" cy="846"/>
+          <a:xfrm>
+            <a:off x="923290" y="2742811"/>
+            <a:ext cx="995024" cy="5504"/>
           </a:xfrm>
           <a:prstGeom prst="straightConnector1">
             <a:avLst/>
           </a:prstGeom>
-          <a:ln w="12700">
+          <a:ln w="15875">
             <a:solidFill>
               <a:schemeClr val="tx2"/>
             </a:solidFill>
@@ -7181,8 +6376,6 @@
           </p:cNvPr>
           <p:cNvCxnSpPr>
             <a:cxnSpLocks/>
-            <a:stCxn id="104" idx="3"/>
-            <a:endCxn id="47" idx="1"/>
           </p:cNvCxnSpPr>
           <p:nvPr/>
         </p:nvCxnSpPr>
@@ -7194,7 +6387,7 @@
           <a:prstGeom prst="straightConnector1">
             <a:avLst/>
           </a:prstGeom>
-          <a:ln w="12700">
+          <a:ln w="15875">
             <a:solidFill>
               <a:schemeClr val="tx2"/>
             </a:solidFill>
@@ -7272,7 +6465,7 @@
             </a:pathLst>
           </a:custGeom>
           <a:noFill/>
-          <a:ln w="12700">
+          <a:ln w="15875">
             <a:solidFill>
               <a:schemeClr val="tx2"/>
             </a:solidFill>
@@ -7406,7 +6599,7 @@
               </a:pathLst>
             </a:custGeom>
             <a:noFill/>
-            <a:ln w="12700">
+            <a:ln w="15875">
               <a:solidFill>
                 <a:schemeClr val="tx2"/>
               </a:solidFill>
@@ -7458,7 +6651,6 @@
             </p:cNvPr>
             <p:cNvCxnSpPr>
               <a:cxnSpLocks/>
-              <a:stCxn id="2" idx="3"/>
             </p:cNvCxnSpPr>
             <p:nvPr/>
           </p:nvCxnSpPr>
@@ -7470,7 +6662,7 @@
             <a:prstGeom prst="straightConnector1">
               <a:avLst/>
             </a:prstGeom>
-            <a:ln w="12700">
+            <a:ln w="15875">
               <a:solidFill>
                 <a:schemeClr val="tx2"/>
               </a:solidFill>
@@ -7587,7 +6779,7 @@
               </a:pathLst>
             </a:custGeom>
             <a:noFill/>
-            <a:ln w="12700">
+            <a:ln w="15875">
               <a:solidFill>
                 <a:schemeClr val="tx2"/>
               </a:solidFill>
@@ -7650,7 +6842,7 @@
             <a:prstGeom prst="straightConnector1">
               <a:avLst/>
             </a:prstGeom>
-            <a:ln w="12700">
+            <a:ln w="15875">
               <a:solidFill>
                 <a:schemeClr val="tx2"/>
               </a:solidFill>
@@ -7685,8 +6877,6 @@
           </p:cNvPr>
           <p:cNvCxnSpPr>
             <a:cxnSpLocks/>
-            <a:stCxn id="7" idx="1"/>
-            <a:endCxn id="4" idx="3"/>
           </p:cNvCxnSpPr>
           <p:nvPr/>
         </p:nvCxnSpPr>
@@ -7698,7 +6888,7 @@
           <a:prstGeom prst="straightConnector1">
             <a:avLst/>
           </a:prstGeom>
-          <a:ln w="12700">
+          <a:ln w="15875">
             <a:solidFill>
               <a:schemeClr val="tx2"/>
             </a:solidFill>
@@ -7776,7 +6966,7 @@
             </a:pathLst>
           </a:custGeom>
           <a:noFill/>
-          <a:ln w="12700">
+          <a:ln w="15875">
             <a:solidFill>
               <a:schemeClr val="tx2"/>
             </a:solidFill>
@@ -7872,7 +7062,7 @@
             </a:pathLst>
           </a:custGeom>
           <a:noFill/>
-          <a:ln w="12700">
+          <a:ln w="15875">
             <a:solidFill>
               <a:schemeClr val="tx2"/>
             </a:solidFill>
@@ -7968,7 +7158,7 @@
             </a:pathLst>
           </a:custGeom>
           <a:noFill/>
-          <a:ln w="12700">
+          <a:ln w="15875">
             <a:solidFill>
               <a:schemeClr val="tx2"/>
             </a:solidFill>
@@ -8064,7 +7254,7 @@
             </a:pathLst>
           </a:custGeom>
           <a:noFill/>
-          <a:ln w="12700">
+          <a:ln w="15875">
             <a:solidFill>
               <a:schemeClr val="tx2"/>
             </a:solidFill>
@@ -8105,6 +7295,672 @@
           </a:p>
         </p:txBody>
       </p:sp>
+      <p:pic>
+        <p:nvPicPr>
+          <p:cNvPr id="58" name="Graphic 6">
+            <a:extLst>
+              <a:ext uri="{FF2B5EF4-FFF2-40B4-BE49-F238E27FC236}">
+                <a16:creationId xmlns:a16="http://schemas.microsoft.com/office/drawing/2014/main" id="{B18F25F0-D79E-4EAC-BE4B-2FB231273405}"/>
+              </a:ext>
+            </a:extLst>
+          </p:cNvPr>
+          <p:cNvPicPr>
+            <a:picLocks noChangeAspect="1" noChangeArrowheads="1"/>
+          </p:cNvPicPr>
+          <p:nvPr/>
+        </p:nvPicPr>
+        <p:blipFill>
+          <a:blip r:embed="rId7">
+            <a:extLst>
+              <a:ext uri="{96DAC541-7B7A-43D3-8B79-37D633B846F1}">
+                <asvg:svgBlip xmlns:asvg="http://schemas.microsoft.com/office/drawing/2016/SVG/main" r:embed="rId8"/>
+              </a:ext>
+            </a:extLst>
+          </a:blip>
+          <a:srcRect/>
+          <a:stretch/>
+        </p:blipFill>
+        <p:spPr bwMode="auto">
+          <a:xfrm>
+            <a:off x="6345936" y="2414016"/>
+            <a:ext cx="762000" cy="762000"/>
+          </a:xfrm>
+          <a:prstGeom prst="rect">
+            <a:avLst/>
+          </a:prstGeom>
+          <a:noFill/>
+          <a:ln>
+            <a:noFill/>
+          </a:ln>
+          <a:extLst>
+            <a:ext uri="{909E8E84-426E-40DD-AFC4-6F175D3DCCD1}">
+              <a14:hiddenFill xmlns:a14="http://schemas.microsoft.com/office/drawing/2010/main">
+                <a:solidFill>
+                  <a:srgbClr val="FFFFFF"/>
+                </a:solidFill>
+              </a14:hiddenFill>
+            </a:ext>
+            <a:ext uri="{91240B29-F687-4F45-9708-019B960494DF}">
+              <a14:hiddenLine xmlns:a14="http://schemas.microsoft.com/office/drawing/2010/main" w="9525">
+                <a:solidFill>
+                  <a:srgbClr val="000000"/>
+                </a:solidFill>
+                <a:miter lim="800000"/>
+                <a:headEnd/>
+                <a:tailEnd/>
+              </a14:hiddenLine>
+            </a:ext>
+          </a:extLst>
+        </p:spPr>
+      </p:pic>
+      <p:pic>
+        <p:nvPicPr>
+          <p:cNvPr id="59" name="Graphic 13">
+            <a:extLst>
+              <a:ext uri="{FF2B5EF4-FFF2-40B4-BE49-F238E27FC236}">
+                <a16:creationId xmlns:a16="http://schemas.microsoft.com/office/drawing/2014/main" id="{26E62974-848D-42EB-80FA-E6C968DFC4B4}"/>
+              </a:ext>
+            </a:extLst>
+          </p:cNvPr>
+          <p:cNvPicPr>
+            <a:picLocks noChangeAspect="1" noChangeArrowheads="1"/>
+          </p:cNvPicPr>
+          <p:nvPr/>
+        </p:nvPicPr>
+        <p:blipFill>
+          <a:blip r:embed="rId9">
+            <a:extLst>
+              <a:ext uri="{96DAC541-7B7A-43D3-8B79-37D633B846F1}">
+                <asvg:svgBlip xmlns:asvg="http://schemas.microsoft.com/office/drawing/2016/SVG/main" r:embed="rId10"/>
+              </a:ext>
+            </a:extLst>
+          </a:blip>
+          <a:srcRect/>
+          <a:stretch/>
+        </p:blipFill>
+        <p:spPr bwMode="auto">
+          <a:xfrm>
+            <a:off x="5239512" y="2039112"/>
+            <a:ext cx="457200" cy="457200"/>
+          </a:xfrm>
+          <a:prstGeom prst="rect">
+            <a:avLst/>
+          </a:prstGeom>
+          <a:noFill/>
+          <a:ln>
+            <a:noFill/>
+          </a:ln>
+          <a:extLst>
+            <a:ext uri="{909E8E84-426E-40DD-AFC4-6F175D3DCCD1}">
+              <a14:hiddenFill xmlns:a14="http://schemas.microsoft.com/office/drawing/2010/main">
+                <a:solidFill>
+                  <a:srgbClr val="FFFFFF"/>
+                </a:solidFill>
+              </a14:hiddenFill>
+            </a:ext>
+            <a:ext uri="{91240B29-F687-4F45-9708-019B960494DF}">
+              <a14:hiddenLine xmlns:a14="http://schemas.microsoft.com/office/drawing/2010/main" w="9525">
+                <a:solidFill>
+                  <a:srgbClr val="000000"/>
+                </a:solidFill>
+                <a:miter lim="800000"/>
+                <a:headEnd/>
+                <a:tailEnd/>
+              </a14:hiddenLine>
+            </a:ext>
+          </a:extLst>
+        </p:spPr>
+      </p:pic>
+      <p:pic>
+        <p:nvPicPr>
+          <p:cNvPr id="60" name="Graphic 13">
+            <a:extLst>
+              <a:ext uri="{FF2B5EF4-FFF2-40B4-BE49-F238E27FC236}">
+                <a16:creationId xmlns:a16="http://schemas.microsoft.com/office/drawing/2014/main" id="{2838896C-2194-4A65-9D0A-3891DF458C99}"/>
+              </a:ext>
+            </a:extLst>
+          </p:cNvPr>
+          <p:cNvPicPr>
+            <a:picLocks noChangeAspect="1" noChangeArrowheads="1"/>
+          </p:cNvPicPr>
+          <p:nvPr/>
+        </p:nvPicPr>
+        <p:blipFill>
+          <a:blip r:embed="rId9">
+            <a:extLst>
+              <a:ext uri="{96DAC541-7B7A-43D3-8B79-37D633B846F1}">
+                <asvg:svgBlip xmlns:asvg="http://schemas.microsoft.com/office/drawing/2016/SVG/main" r:embed="rId10"/>
+              </a:ext>
+            </a:extLst>
+          </a:blip>
+          <a:srcRect/>
+          <a:stretch/>
+        </p:blipFill>
+        <p:spPr bwMode="auto">
+          <a:xfrm>
+            <a:off x="3017520" y="914400"/>
+            <a:ext cx="457200" cy="457200"/>
+          </a:xfrm>
+          <a:prstGeom prst="rect">
+            <a:avLst/>
+          </a:prstGeom>
+          <a:noFill/>
+          <a:ln>
+            <a:noFill/>
+          </a:ln>
+          <a:extLst>
+            <a:ext uri="{909E8E84-426E-40DD-AFC4-6F175D3DCCD1}">
+              <a14:hiddenFill xmlns:a14="http://schemas.microsoft.com/office/drawing/2010/main">
+                <a:solidFill>
+                  <a:srgbClr val="FFFFFF"/>
+                </a:solidFill>
+              </a14:hiddenFill>
+            </a:ext>
+            <a:ext uri="{91240B29-F687-4F45-9708-019B960494DF}">
+              <a14:hiddenLine xmlns:a14="http://schemas.microsoft.com/office/drawing/2010/main" w="9525">
+                <a:solidFill>
+                  <a:srgbClr val="000000"/>
+                </a:solidFill>
+                <a:miter lim="800000"/>
+                <a:headEnd/>
+                <a:tailEnd/>
+              </a14:hiddenLine>
+            </a:ext>
+          </a:extLst>
+        </p:spPr>
+      </p:pic>
+      <p:pic>
+        <p:nvPicPr>
+          <p:cNvPr id="61" name="Graphic 13">
+            <a:extLst>
+              <a:ext uri="{FF2B5EF4-FFF2-40B4-BE49-F238E27FC236}">
+                <a16:creationId xmlns:a16="http://schemas.microsoft.com/office/drawing/2014/main" id="{1B13CFDB-16F2-4808-8837-65A9263F333B}"/>
+              </a:ext>
+            </a:extLst>
+          </p:cNvPr>
+          <p:cNvPicPr>
+            <a:picLocks noChangeAspect="1" noChangeArrowheads="1"/>
+          </p:cNvPicPr>
+          <p:nvPr/>
+        </p:nvPicPr>
+        <p:blipFill>
+          <a:blip r:embed="rId9">
+            <a:extLst>
+              <a:ext uri="{96DAC541-7B7A-43D3-8B79-37D633B846F1}">
+                <asvg:svgBlip xmlns:asvg="http://schemas.microsoft.com/office/drawing/2016/SVG/main" r:embed="rId10"/>
+              </a:ext>
+            </a:extLst>
+          </a:blip>
+          <a:srcRect/>
+          <a:stretch/>
+        </p:blipFill>
+        <p:spPr bwMode="auto">
+          <a:xfrm>
+            <a:off x="3017520" y="3035808"/>
+            <a:ext cx="457200" cy="457200"/>
+          </a:xfrm>
+          <a:prstGeom prst="rect">
+            <a:avLst/>
+          </a:prstGeom>
+          <a:noFill/>
+          <a:ln>
+            <a:noFill/>
+          </a:ln>
+          <a:extLst>
+            <a:ext uri="{909E8E84-426E-40DD-AFC4-6F175D3DCCD1}">
+              <a14:hiddenFill xmlns:a14="http://schemas.microsoft.com/office/drawing/2010/main">
+                <a:solidFill>
+                  <a:srgbClr val="FFFFFF"/>
+                </a:solidFill>
+              </a14:hiddenFill>
+            </a:ext>
+            <a:ext uri="{91240B29-F687-4F45-9708-019B960494DF}">
+              <a14:hiddenLine xmlns:a14="http://schemas.microsoft.com/office/drawing/2010/main" w="9525">
+                <a:solidFill>
+                  <a:srgbClr val="000000"/>
+                </a:solidFill>
+                <a:miter lim="800000"/>
+                <a:headEnd/>
+                <a:tailEnd/>
+              </a14:hiddenLine>
+            </a:ext>
+          </a:extLst>
+        </p:spPr>
+      </p:pic>
+      <p:pic>
+        <p:nvPicPr>
+          <p:cNvPr id="62" name="Graphic 13">
+            <a:extLst>
+              <a:ext uri="{FF2B5EF4-FFF2-40B4-BE49-F238E27FC236}">
+                <a16:creationId xmlns:a16="http://schemas.microsoft.com/office/drawing/2014/main" id="{3D1CF34A-CE7E-41FE-942C-411F1DABF072}"/>
+              </a:ext>
+            </a:extLst>
+          </p:cNvPr>
+          <p:cNvPicPr>
+            <a:picLocks noChangeAspect="1" noChangeArrowheads="1"/>
+          </p:cNvPicPr>
+          <p:nvPr/>
+        </p:nvPicPr>
+        <p:blipFill>
+          <a:blip r:embed="rId9">
+            <a:extLst>
+              <a:ext uri="{96DAC541-7B7A-43D3-8B79-37D633B846F1}">
+                <asvg:svgBlip xmlns:asvg="http://schemas.microsoft.com/office/drawing/2016/SVG/main" r:embed="rId10"/>
+              </a:ext>
+            </a:extLst>
+          </a:blip>
+          <a:srcRect/>
+          <a:stretch/>
+        </p:blipFill>
+        <p:spPr bwMode="auto">
+          <a:xfrm>
+            <a:off x="3017520" y="2103120"/>
+            <a:ext cx="457200" cy="457200"/>
+          </a:xfrm>
+          <a:prstGeom prst="rect">
+            <a:avLst/>
+          </a:prstGeom>
+          <a:noFill/>
+          <a:ln>
+            <a:noFill/>
+          </a:ln>
+          <a:extLst>
+            <a:ext uri="{909E8E84-426E-40DD-AFC4-6F175D3DCCD1}">
+              <a14:hiddenFill xmlns:a14="http://schemas.microsoft.com/office/drawing/2010/main">
+                <a:solidFill>
+                  <a:srgbClr val="FFFFFF"/>
+                </a:solidFill>
+              </a14:hiddenFill>
+            </a:ext>
+            <a:ext uri="{91240B29-F687-4F45-9708-019B960494DF}">
+              <a14:hiddenLine xmlns:a14="http://schemas.microsoft.com/office/drawing/2010/main" w="9525">
+                <a:solidFill>
+                  <a:srgbClr val="000000"/>
+                </a:solidFill>
+                <a:miter lim="800000"/>
+                <a:headEnd/>
+                <a:tailEnd/>
+              </a14:hiddenLine>
+            </a:ext>
+          </a:extLst>
+        </p:spPr>
+      </p:pic>
+      <p:pic>
+        <p:nvPicPr>
+          <p:cNvPr id="63" name="Graphic 62">
+            <a:extLst>
+              <a:ext uri="{FF2B5EF4-FFF2-40B4-BE49-F238E27FC236}">
+                <a16:creationId xmlns:a16="http://schemas.microsoft.com/office/drawing/2014/main" id="{09BADE95-CD75-44CF-9770-A715BA48C29B}"/>
+              </a:ext>
+            </a:extLst>
+          </p:cNvPr>
+          <p:cNvPicPr>
+            <a:picLocks noChangeAspect="1"/>
+          </p:cNvPicPr>
+          <p:nvPr/>
+        </p:nvPicPr>
+        <p:blipFill>
+          <a:blip r:embed="rId11">
+            <a:extLst>
+              <a:ext uri="{96DAC541-7B7A-43D3-8B79-37D633B846F1}">
+                <asvg:svgBlip xmlns:asvg="http://schemas.microsoft.com/office/drawing/2016/SVG/main" r:embed="rId12"/>
+              </a:ext>
+            </a:extLst>
+          </a:blip>
+          <a:stretch>
+            <a:fillRect/>
+          </a:stretch>
+        </p:blipFill>
+        <p:spPr>
+          <a:xfrm>
+            <a:off x="1920240" y="4151376"/>
+            <a:ext cx="457200" cy="457200"/>
+          </a:xfrm>
+          <a:prstGeom prst="rect">
+            <a:avLst/>
+          </a:prstGeom>
+        </p:spPr>
+      </p:pic>
+      <p:pic>
+        <p:nvPicPr>
+          <p:cNvPr id="64" name="Graphic 17">
+            <a:extLst>
+              <a:ext uri="{FF2B5EF4-FFF2-40B4-BE49-F238E27FC236}">
+                <a16:creationId xmlns:a16="http://schemas.microsoft.com/office/drawing/2014/main" id="{D224F861-3658-4FCF-A510-70EDE1943B17}"/>
+              </a:ext>
+            </a:extLst>
+          </p:cNvPr>
+          <p:cNvPicPr>
+            <a:picLocks noChangeAspect="1" noChangeArrowheads="1"/>
+          </p:cNvPicPr>
+          <p:nvPr/>
+        </p:nvPicPr>
+        <p:blipFill>
+          <a:blip r:embed="rId13">
+            <a:extLst>
+              <a:ext uri="{96DAC541-7B7A-43D3-8B79-37D633B846F1}">
+                <asvg:svgBlip xmlns:asvg="http://schemas.microsoft.com/office/drawing/2016/SVG/main" r:embed="rId14"/>
+              </a:ext>
+            </a:extLst>
+          </a:blip>
+          <a:srcRect/>
+          <a:stretch/>
+        </p:blipFill>
+        <p:spPr bwMode="auto">
+          <a:xfrm>
+            <a:off x="7863840" y="3474720"/>
+            <a:ext cx="762000" cy="762000"/>
+          </a:xfrm>
+          <a:prstGeom prst="rect">
+            <a:avLst/>
+          </a:prstGeom>
+          <a:noFill/>
+          <a:ln>
+            <a:noFill/>
+          </a:ln>
+          <a:extLst>
+            <a:ext uri="{909E8E84-426E-40DD-AFC4-6F175D3DCCD1}">
+              <a14:hiddenFill xmlns:a14="http://schemas.microsoft.com/office/drawing/2010/main">
+                <a:solidFill>
+                  <a:srgbClr val="FFFFFF"/>
+                </a:solidFill>
+              </a14:hiddenFill>
+            </a:ext>
+            <a:ext uri="{91240B29-F687-4F45-9708-019B960494DF}">
+              <a14:hiddenLine xmlns:a14="http://schemas.microsoft.com/office/drawing/2010/main" w="9525">
+                <a:solidFill>
+                  <a:srgbClr val="000000"/>
+                </a:solidFill>
+                <a:miter lim="800000"/>
+                <a:headEnd/>
+                <a:tailEnd/>
+              </a14:hiddenLine>
+            </a:ext>
+          </a:extLst>
+        </p:spPr>
+      </p:pic>
+      <p:pic>
+        <p:nvPicPr>
+          <p:cNvPr id="65" name="Graphic 64">
+            <a:extLst>
+              <a:ext uri="{FF2B5EF4-FFF2-40B4-BE49-F238E27FC236}">
+                <a16:creationId xmlns:a16="http://schemas.microsoft.com/office/drawing/2014/main" id="{E3B1F7EE-7841-4472-BD2B-F924EC16DB15}"/>
+              </a:ext>
+            </a:extLst>
+          </p:cNvPr>
+          <p:cNvPicPr>
+            <a:picLocks noChangeAspect="1"/>
+          </p:cNvPicPr>
+          <p:nvPr/>
+        </p:nvPicPr>
+        <p:blipFill>
+          <a:blip r:embed="rId15">
+            <a:extLst>
+              <a:ext uri="{96DAC541-7B7A-43D3-8B79-37D633B846F1}">
+                <asvg:svgBlip xmlns:asvg="http://schemas.microsoft.com/office/drawing/2016/SVG/main" r:embed="rId16"/>
+              </a:ext>
+            </a:extLst>
+          </a:blip>
+          <a:stretch>
+            <a:fillRect/>
+          </a:stretch>
+        </p:blipFill>
+        <p:spPr>
+          <a:xfrm>
+            <a:off x="4142232" y="4151376"/>
+            <a:ext cx="457200" cy="457200"/>
+          </a:xfrm>
+          <a:prstGeom prst="rect">
+            <a:avLst/>
+          </a:prstGeom>
+        </p:spPr>
+      </p:pic>
+      <p:pic>
+        <p:nvPicPr>
+          <p:cNvPr id="66" name="Graphic 19">
+            <a:extLst>
+              <a:ext uri="{FF2B5EF4-FFF2-40B4-BE49-F238E27FC236}">
+                <a16:creationId xmlns:a16="http://schemas.microsoft.com/office/drawing/2014/main" id="{0C569C94-BBA2-4FE9-8272-A004CEE7928D}"/>
+              </a:ext>
+            </a:extLst>
+          </p:cNvPr>
+          <p:cNvPicPr>
+            <a:picLocks noChangeAspect="1" noChangeArrowheads="1"/>
+          </p:cNvPicPr>
+          <p:nvPr/>
+        </p:nvPicPr>
+        <p:blipFill>
+          <a:blip r:embed="rId17">
+            <a:extLst>
+              <a:ext uri="{96DAC541-7B7A-43D3-8B79-37D633B846F1}">
+                <asvg:svgBlip xmlns:asvg="http://schemas.microsoft.com/office/drawing/2016/SVG/main" r:embed="rId18"/>
+              </a:ext>
+            </a:extLst>
+          </a:blip>
+          <a:srcRect/>
+          <a:stretch/>
+        </p:blipFill>
+        <p:spPr bwMode="auto">
+          <a:xfrm>
+            <a:off x="7296912" y="795528"/>
+            <a:ext cx="762000" cy="762000"/>
+          </a:xfrm>
+          <a:prstGeom prst="rect">
+            <a:avLst/>
+          </a:prstGeom>
+          <a:noFill/>
+          <a:ln>
+            <a:noFill/>
+          </a:ln>
+          <a:extLst>
+            <a:ext uri="{909E8E84-426E-40DD-AFC4-6F175D3DCCD1}">
+              <a14:hiddenFill xmlns:a14="http://schemas.microsoft.com/office/drawing/2010/main">
+                <a:solidFill>
+                  <a:srgbClr val="FFFFFF"/>
+                </a:solidFill>
+              </a14:hiddenFill>
+            </a:ext>
+            <a:ext uri="{91240B29-F687-4F45-9708-019B960494DF}">
+              <a14:hiddenLine xmlns:a14="http://schemas.microsoft.com/office/drawing/2010/main" w="9525">
+                <a:solidFill>
+                  <a:srgbClr val="000000"/>
+                </a:solidFill>
+                <a:miter lim="800000"/>
+                <a:headEnd/>
+                <a:tailEnd/>
+              </a14:hiddenLine>
+            </a:ext>
+          </a:extLst>
+        </p:spPr>
+      </p:pic>
+      <p:pic>
+        <p:nvPicPr>
+          <p:cNvPr id="67" name="Graphic 6">
+            <a:extLst>
+              <a:ext uri="{FF2B5EF4-FFF2-40B4-BE49-F238E27FC236}">
+                <a16:creationId xmlns:a16="http://schemas.microsoft.com/office/drawing/2014/main" id="{DFF7DA98-2B47-4709-BDC3-41A9BE2020E7}"/>
+              </a:ext>
+            </a:extLst>
+          </p:cNvPr>
+          <p:cNvPicPr>
+            <a:picLocks noChangeAspect="1" noChangeArrowheads="1"/>
+          </p:cNvPicPr>
+          <p:nvPr/>
+        </p:nvPicPr>
+        <p:blipFill>
+          <a:blip r:embed="rId19">
+            <a:extLst>
+              <a:ext uri="{96DAC541-7B7A-43D3-8B79-37D633B846F1}">
+                <asvg:svgBlip xmlns:asvg="http://schemas.microsoft.com/office/drawing/2016/SVG/main" r:embed="rId20"/>
+              </a:ext>
+            </a:extLst>
+          </a:blip>
+          <a:srcRect/>
+          <a:stretch/>
+        </p:blipFill>
+        <p:spPr bwMode="auto">
+          <a:xfrm>
+            <a:off x="1920240" y="2523744"/>
+            <a:ext cx="457200" cy="457200"/>
+          </a:xfrm>
+          <a:prstGeom prst="rect">
+            <a:avLst/>
+          </a:prstGeom>
+          <a:noFill/>
+          <a:ln>
+            <a:noFill/>
+          </a:ln>
+          <a:extLst>
+            <a:ext uri="{909E8E84-426E-40DD-AFC4-6F175D3DCCD1}">
+              <a14:hiddenFill xmlns:a14="http://schemas.microsoft.com/office/drawing/2010/main">
+                <a:solidFill>
+                  <a:srgbClr val="FFFFFF"/>
+                </a:solidFill>
+              </a14:hiddenFill>
+            </a:ext>
+            <a:ext uri="{91240B29-F687-4F45-9708-019B960494DF}">
+              <a14:hiddenLine xmlns:a14="http://schemas.microsoft.com/office/drawing/2010/main" w="9525">
+                <a:solidFill>
+                  <a:srgbClr val="000000"/>
+                </a:solidFill>
+                <a:miter lim="800000"/>
+                <a:headEnd/>
+                <a:tailEnd/>
+              </a14:hiddenLine>
+            </a:ext>
+          </a:extLst>
+        </p:spPr>
+      </p:pic>
+      <p:pic>
+        <p:nvPicPr>
+          <p:cNvPr id="68" name="Graphic 6">
+            <a:extLst>
+              <a:ext uri="{FF2B5EF4-FFF2-40B4-BE49-F238E27FC236}">
+                <a16:creationId xmlns:a16="http://schemas.microsoft.com/office/drawing/2014/main" id="{BFF4FFC7-31B4-4D55-B0D1-548E43436196}"/>
+              </a:ext>
+            </a:extLst>
+          </p:cNvPr>
+          <p:cNvPicPr>
+            <a:picLocks noChangeAspect="1" noChangeArrowheads="1"/>
+          </p:cNvPicPr>
+          <p:nvPr/>
+        </p:nvPicPr>
+        <p:blipFill>
+          <a:blip r:embed="rId19">
+            <a:extLst>
+              <a:ext uri="{96DAC541-7B7A-43D3-8B79-37D633B846F1}">
+                <asvg:svgBlip xmlns:asvg="http://schemas.microsoft.com/office/drawing/2016/SVG/main" r:embed="rId20"/>
+              </a:ext>
+            </a:extLst>
+          </a:blip>
+          <a:srcRect/>
+          <a:stretch/>
+        </p:blipFill>
+        <p:spPr bwMode="auto">
+          <a:xfrm>
+            <a:off x="1920240" y="914400"/>
+            <a:ext cx="457200" cy="457200"/>
+          </a:xfrm>
+          <a:prstGeom prst="rect">
+            <a:avLst/>
+          </a:prstGeom>
+          <a:noFill/>
+          <a:ln>
+            <a:noFill/>
+          </a:ln>
+          <a:extLst>
+            <a:ext uri="{909E8E84-426E-40DD-AFC4-6F175D3DCCD1}">
+              <a14:hiddenFill xmlns:a14="http://schemas.microsoft.com/office/drawing/2010/main">
+                <a:solidFill>
+                  <a:srgbClr val="FFFFFF"/>
+                </a:solidFill>
+              </a14:hiddenFill>
+            </a:ext>
+            <a:ext uri="{91240B29-F687-4F45-9708-019B960494DF}">
+              <a14:hiddenLine xmlns:a14="http://schemas.microsoft.com/office/drawing/2010/main" w="9525">
+                <a:solidFill>
+                  <a:srgbClr val="000000"/>
+                </a:solidFill>
+                <a:miter lim="800000"/>
+                <a:headEnd/>
+                <a:tailEnd/>
+              </a14:hiddenLine>
+            </a:ext>
+          </a:extLst>
+        </p:spPr>
+      </p:pic>
+      <p:pic>
+        <p:nvPicPr>
+          <p:cNvPr id="69" name="Graphic 68">
+            <a:extLst>
+              <a:ext uri="{FF2B5EF4-FFF2-40B4-BE49-F238E27FC236}">
+                <a16:creationId xmlns:a16="http://schemas.microsoft.com/office/drawing/2014/main" id="{446B5341-D139-487B-9F4D-3B53320DB98B}"/>
+              </a:ext>
+            </a:extLst>
+          </p:cNvPr>
+          <p:cNvPicPr>
+            <a:picLocks noChangeAspect="1"/>
+          </p:cNvPicPr>
+          <p:nvPr/>
+        </p:nvPicPr>
+        <p:blipFill>
+          <a:blip r:embed="rId21">
+            <a:extLst>
+              <a:ext uri="{96DAC541-7B7A-43D3-8B79-37D633B846F1}">
+                <asvg:svgBlip xmlns:asvg="http://schemas.microsoft.com/office/drawing/2016/SVG/main" r:embed="rId22"/>
+              </a:ext>
+            </a:extLst>
+          </a:blip>
+          <a:stretch>
+            <a:fillRect/>
+          </a:stretch>
+        </p:blipFill>
+        <p:spPr>
+          <a:xfrm>
+            <a:off x="4251960" y="1572768"/>
+            <a:ext cx="457200" cy="457200"/>
+          </a:xfrm>
+          <a:prstGeom prst="rect">
+            <a:avLst/>
+          </a:prstGeom>
+        </p:spPr>
+      </p:pic>
+      <p:pic>
+        <p:nvPicPr>
+          <p:cNvPr id="70" name="Graphic 69">
+            <a:extLst>
+              <a:ext uri="{FF2B5EF4-FFF2-40B4-BE49-F238E27FC236}">
+                <a16:creationId xmlns:a16="http://schemas.microsoft.com/office/drawing/2014/main" id="{467DAFE2-B420-43B6-B1C7-0F8C247DE332}"/>
+              </a:ext>
+            </a:extLst>
+          </p:cNvPr>
+          <p:cNvPicPr>
+            <a:picLocks noChangeAspect="1"/>
+          </p:cNvPicPr>
+          <p:nvPr/>
+        </p:nvPicPr>
+        <p:blipFill>
+          <a:blip r:embed="rId23">
+            <a:extLst>
+              <a:ext uri="{96DAC541-7B7A-43D3-8B79-37D633B846F1}">
+                <asvg:svgBlip xmlns:asvg="http://schemas.microsoft.com/office/drawing/2016/SVG/main" r:embed="rId24"/>
+              </a:ext>
+            </a:extLst>
+          </a:blip>
+          <a:stretch>
+            <a:fillRect/>
+          </a:stretch>
+        </p:blipFill>
+        <p:spPr>
+          <a:xfrm>
+            <a:off x="4251960" y="2551176"/>
+            <a:ext cx="457200" cy="457200"/>
+          </a:xfrm>
+          <a:prstGeom prst="rect">
+            <a:avLst/>
+          </a:prstGeom>
+        </p:spPr>
+      </p:pic>
     </p:spTree>
     <p:extLst>
       <p:ext uri="{BB962C8B-B14F-4D97-AF65-F5344CB8AC3E}">

</xml_diff>

<commit_message>
TW edits for diagram
</commit_message>
<xml_diff>
--- a/docs/deployment_guide/images/headend-system-simulator-architecture-diagram.pptx
+++ b/docs/deployment_guide/images/headend-system-simulator-architecture-diagram.pptx
@@ -3326,64 +3326,6 @@
           <a:chExt cx="0" cy="0"/>
         </a:xfrm>
       </p:grpSpPr>
-      <p:pic>
-        <p:nvPicPr>
-          <p:cNvPr id="13" name="Graphic 22">
-            <a:extLst>
-              <a:ext uri="{FF2B5EF4-FFF2-40B4-BE49-F238E27FC236}">
-                <a16:creationId xmlns:a16="http://schemas.microsoft.com/office/drawing/2014/main" id="{3B667FF7-D8FA-A350-49D1-2E63BE0BE96E}"/>
-              </a:ext>
-            </a:extLst>
-          </p:cNvPr>
-          <p:cNvPicPr>
-            <a:picLocks noChangeAspect="1" noChangeArrowheads="1"/>
-          </p:cNvPicPr>
-          <p:nvPr/>
-        </p:nvPicPr>
-        <p:blipFill>
-          <a:blip r:embed="rId2">
-            <a:extLst>
-              <a:ext uri="{96DAC541-7B7A-43D3-8B79-37D633B846F1}">
-                <asvg:svgBlip xmlns:asvg="http://schemas.microsoft.com/office/drawing/2016/SVG/main" r:embed="rId3"/>
-              </a:ext>
-            </a:extLst>
-          </a:blip>
-          <a:srcRect/>
-          <a:stretch/>
-        </p:blipFill>
-        <p:spPr bwMode="auto">
-          <a:xfrm>
-            <a:off x="466090" y="2514211"/>
-            <a:ext cx="457200" cy="457200"/>
-          </a:xfrm>
-          <a:prstGeom prst="rect">
-            <a:avLst/>
-          </a:prstGeom>
-          <a:noFill/>
-          <a:ln>
-            <a:noFill/>
-          </a:ln>
-          <a:extLst>
-            <a:ext uri="{909E8E84-426E-40DD-AFC4-6F175D3DCCD1}">
-              <a14:hiddenFill xmlns:a14="http://schemas.microsoft.com/office/drawing/2010/main">
-                <a:solidFill>
-                  <a:srgbClr val="FFFFFF"/>
-                </a:solidFill>
-              </a14:hiddenFill>
-            </a:ext>
-            <a:ext uri="{91240B29-F687-4F45-9708-019B960494DF}">
-              <a14:hiddenLine xmlns:a14="http://schemas.microsoft.com/office/drawing/2010/main" w="9525">
-                <a:solidFill>
-                  <a:srgbClr val="000000"/>
-                </a:solidFill>
-                <a:miter lim="800000"/>
-                <a:headEnd/>
-                <a:tailEnd/>
-              </a14:hiddenLine>
-            </a:ext>
-          </a:extLst>
-        </p:spPr>
-      </p:pic>
       <p:cxnSp>
         <p:nvCxnSpPr>
           <p:cNvPr id="173" name="Straight Arrow Connector 172">
@@ -3396,13 +3338,14 @@
           <p:cNvCxnSpPr>
             <a:cxnSpLocks/>
             <a:stCxn id="54" idx="1"/>
+            <a:endCxn id="66" idx="3"/>
           </p:cNvCxnSpPr>
           <p:nvPr/>
         </p:nvCxnSpPr>
         <p:spPr>
           <a:xfrm flipH="1">
-            <a:off x="8056689" y="1167345"/>
-            <a:ext cx="1635502" cy="6350"/>
+            <a:off x="8058912" y="1143000"/>
+            <a:ext cx="1634085" cy="0"/>
           </a:xfrm>
           <a:prstGeom prst="straightConnector1">
             <a:avLst/>
@@ -3441,14 +3384,15 @@
           </p:cNvPr>
           <p:cNvCxnSpPr>
             <a:cxnSpLocks/>
-            <a:stCxn id="13" idx="0"/>
+            <a:stCxn id="2" idx="0"/>
+            <a:endCxn id="68" idx="1"/>
           </p:cNvCxnSpPr>
           <p:nvPr/>
         </p:nvCxnSpPr>
         <p:spPr>
           <a:xfrm rot="5400000" flipH="1" flipV="1">
-            <a:off x="621636" y="1216055"/>
-            <a:ext cx="1371211" cy="1225102"/>
+            <a:off x="617093" y="1220597"/>
+            <a:ext cx="1380744" cy="1225550"/>
           </a:xfrm>
           <a:prstGeom prst="bentConnector2">
             <a:avLst/>
@@ -3488,13 +3432,14 @@
           <p:cNvCxnSpPr>
             <a:cxnSpLocks/>
             <a:stCxn id="189" idx="2"/>
+            <a:endCxn id="63" idx="1"/>
           </p:cNvCxnSpPr>
           <p:nvPr/>
         </p:nvCxnSpPr>
         <p:spPr>
           <a:xfrm rot="16200000" flipH="1">
-            <a:off x="742769" y="3204391"/>
-            <a:ext cx="1133817" cy="1217274"/>
+            <a:off x="743712" y="3203448"/>
+            <a:ext cx="1133856" cy="1219200"/>
           </a:xfrm>
           <a:prstGeom prst="bentConnector2">
             <a:avLst/>
@@ -3767,10 +3712,10 @@
           <p:nvPr/>
         </p:nvPicPr>
         <p:blipFill>
-          <a:blip r:embed="rId4">
+          <a:blip r:embed="rId2">
             <a:extLst>
               <a:ext uri="{96DAC541-7B7A-43D3-8B79-37D633B846F1}">
-                <asvg:svgBlip xmlns:asvg="http://schemas.microsoft.com/office/drawing/2016/SVG/main" r:embed="rId5"/>
+                <asvg:svgBlip xmlns:asvg="http://schemas.microsoft.com/office/drawing/2016/SVG/main" r:embed="rId3"/>
               </a:ext>
             </a:extLst>
           </a:blip>
@@ -3787,102 +3732,6 @@
           </a:prstGeom>
         </p:spPr>
       </p:pic>
-      <p:sp>
-        <p:nvSpPr>
-          <p:cNvPr id="92" name="Freeform 91">
-            <a:extLst>
-              <a:ext uri="{FF2B5EF4-FFF2-40B4-BE49-F238E27FC236}">
-                <a16:creationId xmlns:a16="http://schemas.microsoft.com/office/drawing/2014/main" id="{81156875-571A-4201-8663-0C52AB5FFE03}"/>
-              </a:ext>
-            </a:extLst>
-          </p:cNvPr>
-          <p:cNvSpPr/>
-          <p:nvPr/>
-        </p:nvSpPr>
-        <p:spPr>
-          <a:xfrm rot="10800000" flipH="1">
-            <a:off x="4597461" y="3447279"/>
-            <a:ext cx="2123537" cy="932992"/>
-          </a:xfrm>
-          <a:custGeom>
-            <a:avLst/>
-            <a:gdLst>
-              <a:gd name="connsiteX0" fmla="*/ 1371600 w 1371600"/>
-              <a:gd name="connsiteY0" fmla="*/ 711200 h 711200"/>
-              <a:gd name="connsiteX1" fmla="*/ 1371600 w 1371600"/>
-              <a:gd name="connsiteY1" fmla="*/ 0 h 711200"/>
-              <a:gd name="connsiteX2" fmla="*/ 0 w 1371600"/>
-              <a:gd name="connsiteY2" fmla="*/ 0 h 711200"/>
-            </a:gdLst>
-            <a:ahLst/>
-            <a:cxnLst>
-              <a:cxn ang="0">
-                <a:pos x="connsiteX0" y="connsiteY0"/>
-              </a:cxn>
-              <a:cxn ang="0">
-                <a:pos x="connsiteX1" y="connsiteY1"/>
-              </a:cxn>
-              <a:cxn ang="0">
-                <a:pos x="connsiteX2" y="connsiteY2"/>
-              </a:cxn>
-            </a:cxnLst>
-            <a:rect l="l" t="t" r="r" b="b"/>
-            <a:pathLst>
-              <a:path w="1371600" h="711200">
-                <a:moveTo>
-                  <a:pt x="1371600" y="711200"/>
-                </a:moveTo>
-                <a:lnTo>
-                  <a:pt x="1371600" y="0"/>
-                </a:lnTo>
-                <a:lnTo>
-                  <a:pt x="0" y="0"/>
-                </a:lnTo>
-              </a:path>
-            </a:pathLst>
-          </a:custGeom>
-          <a:noFill/>
-          <a:ln w="15875">
-            <a:solidFill>
-              <a:schemeClr val="tx2"/>
-            </a:solidFill>
-            <a:headEnd type="none" w="med" len="sm"/>
-            <a:tailEnd type="arrow" w="med" len="sm"/>
-          </a:ln>
-        </p:spPr>
-        <p:style>
-          <a:lnRef idx="2">
-            <a:schemeClr val="accent1">
-              <a:shade val="50000"/>
-            </a:schemeClr>
-          </a:lnRef>
-          <a:fillRef idx="1">
-            <a:schemeClr val="accent1"/>
-          </a:fillRef>
-          <a:effectRef idx="0">
-            <a:schemeClr val="accent1"/>
-          </a:effectRef>
-          <a:fontRef idx="minor">
-            <a:schemeClr val="lt1"/>
-          </a:fontRef>
-        </p:style>
-        <p:txBody>
-          <a:bodyPr anchor="ctr"/>
-          <a:lstStyle/>
-          <a:p>
-            <a:pPr algn="ctr" eaLnBrk="1" fontAlgn="auto" hangingPunct="1">
-              <a:spcBef>
-                <a:spcPts val="0"/>
-              </a:spcBef>
-              <a:spcAft>
-                <a:spcPts val="0"/>
-              </a:spcAft>
-              <a:defRPr/>
-            </a:pPr>
-            <a:endParaRPr lang="en-US" dirty="0"/>
-          </a:p>
-        </p:txBody>
-      </p:sp>
       <p:sp>
         <p:nvSpPr>
           <p:cNvPr id="95" name="TextBox 9">
@@ -4070,13 +3919,15 @@
           </p:cNvPr>
           <p:cNvCxnSpPr>
             <a:cxnSpLocks/>
+            <a:stCxn id="68" idx="3"/>
+            <a:endCxn id="60" idx="1"/>
           </p:cNvCxnSpPr>
           <p:nvPr/>
         </p:nvCxnSpPr>
         <p:spPr>
           <a:xfrm>
-            <a:off x="2376992" y="1143000"/>
-            <a:ext cx="640528" cy="0"/>
+            <a:off x="2377440" y="1143000"/>
+            <a:ext cx="639698" cy="0"/>
           </a:xfrm>
           <a:prstGeom prst="straightConnector1">
             <a:avLst/>
@@ -5101,7 +4952,7 @@
         </p:nvSpPr>
         <p:spPr bwMode="auto">
           <a:xfrm>
-            <a:off x="6276178" y="3200400"/>
+            <a:off x="6276178" y="3165374"/>
             <a:ext cx="914400" cy="276999"/>
           </a:xfrm>
           <a:prstGeom prst="rect">
@@ -5423,7 +5274,7 @@
         </p:nvSpPr>
         <p:spPr bwMode="auto">
           <a:xfrm>
-            <a:off x="6833680" y="1554480"/>
+            <a:off x="6833680" y="1518720"/>
             <a:ext cx="1681017" cy="276999"/>
           </a:xfrm>
           <a:prstGeom prst="rect">
@@ -5740,13 +5591,15 @@
           </p:cNvPr>
           <p:cNvCxnSpPr>
             <a:cxnSpLocks/>
+            <a:stCxn id="65" idx="1"/>
+            <a:endCxn id="63" idx="3"/>
           </p:cNvCxnSpPr>
           <p:nvPr/>
         </p:nvCxnSpPr>
         <p:spPr>
           <a:xfrm flipH="1">
-            <a:off x="2375514" y="4379937"/>
-            <a:ext cx="1764747" cy="0"/>
+            <a:off x="2377440" y="4379976"/>
+            <a:ext cx="1869514" cy="0"/>
           </a:xfrm>
           <a:prstGeom prst="straightConnector1">
             <a:avLst/>
@@ -5790,7 +5643,7 @@
         </p:nvSpPr>
         <p:spPr bwMode="auto">
           <a:xfrm>
-            <a:off x="3778206" y="4617720"/>
+            <a:off x="3866977" y="4617720"/>
             <a:ext cx="1196552" cy="276999"/>
           </a:xfrm>
           <a:prstGeom prst="rect">
@@ -6111,7 +5964,7 @@
           <p:nvPr/>
         </p:nvPicPr>
         <p:blipFill>
-          <a:blip r:embed="rId6">
+          <a:blip r:embed="rId4">
             <a:extLst>
               <a:ext uri="{28A0092B-C50C-407E-A947-70E740481C1C}">
                 <a14:useLocalDpi xmlns:a14="http://schemas.microsoft.com/office/drawing/2010/main" val="0"/>
@@ -6125,7 +5978,7 @@
         </p:blipFill>
         <p:spPr bwMode="auto">
           <a:xfrm>
-            <a:off x="9692191" y="938745"/>
+            <a:off x="9692997" y="914400"/>
             <a:ext cx="457200" cy="457200"/>
           </a:xfrm>
           <a:prstGeom prst="rect">
@@ -6172,7 +6025,7 @@
         </p:nvSpPr>
         <p:spPr bwMode="auto">
           <a:xfrm>
-            <a:off x="9378501" y="1389888"/>
+            <a:off x="9372957" y="1389888"/>
             <a:ext cx="1097280" cy="457200"/>
           </a:xfrm>
           <a:prstGeom prst="rect">
@@ -6330,14 +6183,15 @@
           </p:cNvPr>
           <p:cNvCxnSpPr>
             <a:cxnSpLocks/>
-            <a:stCxn id="13" idx="3"/>
+            <a:stCxn id="2" idx="3"/>
+            <a:endCxn id="67" idx="1"/>
           </p:cNvCxnSpPr>
           <p:nvPr/>
         </p:nvCxnSpPr>
         <p:spPr>
           <a:xfrm>
-            <a:off x="923290" y="2742811"/>
-            <a:ext cx="995024" cy="5504"/>
+            <a:off x="923290" y="2752344"/>
+            <a:ext cx="996950" cy="0"/>
           </a:xfrm>
           <a:prstGeom prst="straightConnector1">
             <a:avLst/>
@@ -6376,13 +6230,15 @@
           </p:cNvPr>
           <p:cNvCxnSpPr>
             <a:cxnSpLocks/>
+            <a:stCxn id="60" idx="3"/>
+            <a:endCxn id="66" idx="1"/>
           </p:cNvCxnSpPr>
           <p:nvPr/>
         </p:nvCxnSpPr>
         <p:spPr>
           <a:xfrm>
-            <a:off x="3474720" y="1143000"/>
-            <a:ext cx="3819969" cy="30695"/>
+            <a:off x="3474338" y="1143000"/>
+            <a:ext cx="3822574" cy="0"/>
           </a:xfrm>
           <a:prstGeom prst="straightConnector1">
             <a:avLst/>
@@ -6656,8 +6512,8 @@
           </p:nvCxnSpPr>
           <p:spPr>
             <a:xfrm flipV="1">
-              <a:off x="2486957" y="1723105"/>
-              <a:ext cx="748687" cy="1"/>
+              <a:off x="2486957" y="1723106"/>
+              <a:ext cx="729735" cy="0"/>
             </a:xfrm>
             <a:prstGeom prst="straightConnector1">
               <a:avLst/>
@@ -6877,13 +6733,15 @@
           </p:cNvPr>
           <p:cNvCxnSpPr>
             <a:cxnSpLocks/>
+            <a:stCxn id="58" idx="1"/>
+            <a:endCxn id="70" idx="3"/>
           </p:cNvCxnSpPr>
           <p:nvPr/>
         </p:nvCxnSpPr>
         <p:spPr>
           <a:xfrm flipH="1" flipV="1">
-            <a:off x="4709160" y="2783807"/>
-            <a:ext cx="1640257" cy="11209"/>
+            <a:off x="4709160" y="2779776"/>
+            <a:ext cx="1636776" cy="1697"/>
           </a:xfrm>
           <a:prstGeom prst="straightConnector1">
             <a:avLst/>
@@ -7009,102 +6867,6 @@
       </p:sp>
       <p:sp>
         <p:nvSpPr>
-          <p:cNvPr id="174" name="Freeform 60">
-            <a:extLst>
-              <a:ext uri="{FF2B5EF4-FFF2-40B4-BE49-F238E27FC236}">
-                <a16:creationId xmlns:a16="http://schemas.microsoft.com/office/drawing/2014/main" id="{4B450AB8-B486-4DE1-ADFB-F5CA14502E55}"/>
-              </a:ext>
-            </a:extLst>
-          </p:cNvPr>
-          <p:cNvSpPr/>
-          <p:nvPr/>
-        </p:nvSpPr>
-        <p:spPr>
-          <a:xfrm rot="16200000" flipH="1" flipV="1">
-            <a:off x="6876527" y="1995856"/>
-            <a:ext cx="1012187" cy="586137"/>
-          </a:xfrm>
-          <a:custGeom>
-            <a:avLst/>
-            <a:gdLst>
-              <a:gd name="connsiteX0" fmla="*/ 1371600 w 1371600"/>
-              <a:gd name="connsiteY0" fmla="*/ 711200 h 711200"/>
-              <a:gd name="connsiteX1" fmla="*/ 1371600 w 1371600"/>
-              <a:gd name="connsiteY1" fmla="*/ 0 h 711200"/>
-              <a:gd name="connsiteX2" fmla="*/ 0 w 1371600"/>
-              <a:gd name="connsiteY2" fmla="*/ 0 h 711200"/>
-            </a:gdLst>
-            <a:ahLst/>
-            <a:cxnLst>
-              <a:cxn ang="0">
-                <a:pos x="connsiteX0" y="connsiteY0"/>
-              </a:cxn>
-              <a:cxn ang="0">
-                <a:pos x="connsiteX1" y="connsiteY1"/>
-              </a:cxn>
-              <a:cxn ang="0">
-                <a:pos x="connsiteX2" y="connsiteY2"/>
-              </a:cxn>
-            </a:cxnLst>
-            <a:rect l="l" t="t" r="r" b="b"/>
-            <a:pathLst>
-              <a:path w="1371600" h="711200">
-                <a:moveTo>
-                  <a:pt x="1371600" y="711200"/>
-                </a:moveTo>
-                <a:lnTo>
-                  <a:pt x="1371600" y="0"/>
-                </a:lnTo>
-                <a:lnTo>
-                  <a:pt x="0" y="0"/>
-                </a:lnTo>
-              </a:path>
-            </a:pathLst>
-          </a:custGeom>
-          <a:noFill/>
-          <a:ln w="15875">
-            <a:solidFill>
-              <a:schemeClr val="tx2"/>
-            </a:solidFill>
-            <a:headEnd type="none" w="med" len="sm"/>
-            <a:tailEnd type="arrow" w="med" len="sm"/>
-          </a:ln>
-        </p:spPr>
-        <p:style>
-          <a:lnRef idx="2">
-            <a:schemeClr val="accent1">
-              <a:shade val="50000"/>
-            </a:schemeClr>
-          </a:lnRef>
-          <a:fillRef idx="1">
-            <a:schemeClr val="accent1"/>
-          </a:fillRef>
-          <a:effectRef idx="0">
-            <a:schemeClr val="accent1"/>
-          </a:effectRef>
-          <a:fontRef idx="minor">
-            <a:schemeClr val="lt1"/>
-          </a:fontRef>
-        </p:style>
-        <p:txBody>
-          <a:bodyPr anchor="ctr"/>
-          <a:lstStyle/>
-          <a:p>
-            <a:pPr algn="ctr" eaLnBrk="1" fontAlgn="auto" hangingPunct="1">
-              <a:spcBef>
-                <a:spcPts val="0"/>
-              </a:spcBef>
-              <a:spcAft>
-                <a:spcPts val="0"/>
-              </a:spcAft>
-              <a:defRPr/>
-            </a:pPr>
-            <a:endParaRPr lang="en-US" dirty="0"/>
-          </a:p>
-        </p:txBody>
-      </p:sp>
-      <p:sp>
-        <p:nvSpPr>
           <p:cNvPr id="191" name="Freeform 59">
             <a:extLst>
               <a:ext uri="{FF2B5EF4-FFF2-40B4-BE49-F238E27FC236}">
@@ -7310,10 +7072,10 @@
           <p:nvPr/>
         </p:nvPicPr>
         <p:blipFill>
-          <a:blip r:embed="rId7">
+          <a:blip r:embed="rId5">
             <a:extLst>
               <a:ext uri="{96DAC541-7B7A-43D3-8B79-37D633B846F1}">
-                <asvg:svgBlip xmlns:asvg="http://schemas.microsoft.com/office/drawing/2016/SVG/main" r:embed="rId8"/>
+                <asvg:svgBlip xmlns:asvg="http://schemas.microsoft.com/office/drawing/2016/SVG/main" r:embed="rId6"/>
               </a:ext>
             </a:extLst>
           </a:blip>
@@ -7322,7 +7084,7 @@
         </p:blipFill>
         <p:spPr bwMode="auto">
           <a:xfrm>
-            <a:off x="6345936" y="2414016"/>
+            <a:off x="6345936" y="2400473"/>
             <a:ext cx="762000" cy="762000"/>
           </a:xfrm>
           <a:prstGeom prst="rect">
@@ -7368,10 +7130,10 @@
           <p:nvPr/>
         </p:nvPicPr>
         <p:blipFill>
-          <a:blip r:embed="rId9">
+          <a:blip r:embed="rId7">
             <a:extLst>
               <a:ext uri="{96DAC541-7B7A-43D3-8B79-37D633B846F1}">
-                <asvg:svgBlip xmlns:asvg="http://schemas.microsoft.com/office/drawing/2016/SVG/main" r:embed="rId10"/>
+                <asvg:svgBlip xmlns:asvg="http://schemas.microsoft.com/office/drawing/2016/SVG/main" r:embed="rId8"/>
               </a:ext>
             </a:extLst>
           </a:blip>
@@ -7426,10 +7188,10 @@
           <p:nvPr/>
         </p:nvPicPr>
         <p:blipFill>
-          <a:blip r:embed="rId9">
+          <a:blip r:embed="rId7">
             <a:extLst>
               <a:ext uri="{96DAC541-7B7A-43D3-8B79-37D633B846F1}">
-                <asvg:svgBlip xmlns:asvg="http://schemas.microsoft.com/office/drawing/2016/SVG/main" r:embed="rId10"/>
+                <asvg:svgBlip xmlns:asvg="http://schemas.microsoft.com/office/drawing/2016/SVG/main" r:embed="rId8"/>
               </a:ext>
             </a:extLst>
           </a:blip>
@@ -7438,7 +7200,7 @@
         </p:blipFill>
         <p:spPr bwMode="auto">
           <a:xfrm>
-            <a:off x="3017520" y="914400"/>
+            <a:off x="3017138" y="914400"/>
             <a:ext cx="457200" cy="457200"/>
           </a:xfrm>
           <a:prstGeom prst="rect">
@@ -7484,10 +7246,10 @@
           <p:nvPr/>
         </p:nvPicPr>
         <p:blipFill>
-          <a:blip r:embed="rId9">
+          <a:blip r:embed="rId7">
             <a:extLst>
               <a:ext uri="{96DAC541-7B7A-43D3-8B79-37D633B846F1}">
-                <asvg:svgBlip xmlns:asvg="http://schemas.microsoft.com/office/drawing/2016/SVG/main" r:embed="rId10"/>
+                <asvg:svgBlip xmlns:asvg="http://schemas.microsoft.com/office/drawing/2016/SVG/main" r:embed="rId8"/>
               </a:ext>
             </a:extLst>
           </a:blip>
@@ -7542,10 +7304,10 @@
           <p:nvPr/>
         </p:nvPicPr>
         <p:blipFill>
-          <a:blip r:embed="rId9">
+          <a:blip r:embed="rId7">
             <a:extLst>
               <a:ext uri="{96DAC541-7B7A-43D3-8B79-37D633B846F1}">
-                <asvg:svgBlip xmlns:asvg="http://schemas.microsoft.com/office/drawing/2016/SVG/main" r:embed="rId10"/>
+                <asvg:svgBlip xmlns:asvg="http://schemas.microsoft.com/office/drawing/2016/SVG/main" r:embed="rId8"/>
               </a:ext>
             </a:extLst>
           </a:blip>
@@ -7600,10 +7362,10 @@
           <p:nvPr/>
         </p:nvPicPr>
         <p:blipFill>
-          <a:blip r:embed="rId11">
+          <a:blip r:embed="rId9">
             <a:extLst>
               <a:ext uri="{96DAC541-7B7A-43D3-8B79-37D633B846F1}">
-                <asvg:svgBlip xmlns:asvg="http://schemas.microsoft.com/office/drawing/2016/SVG/main" r:embed="rId12"/>
+                <asvg:svgBlip xmlns:asvg="http://schemas.microsoft.com/office/drawing/2016/SVG/main" r:embed="rId10"/>
               </a:ext>
             </a:extLst>
           </a:blip>
@@ -7636,10 +7398,10 @@
           <p:nvPr/>
         </p:nvPicPr>
         <p:blipFill>
-          <a:blip r:embed="rId13">
+          <a:blip r:embed="rId11">
             <a:extLst>
               <a:ext uri="{96DAC541-7B7A-43D3-8B79-37D633B846F1}">
-                <asvg:svgBlip xmlns:asvg="http://schemas.microsoft.com/office/drawing/2016/SVG/main" r:embed="rId14"/>
+                <asvg:svgBlip xmlns:asvg="http://schemas.microsoft.com/office/drawing/2016/SVG/main" r:embed="rId12"/>
               </a:ext>
             </a:extLst>
           </a:blip>
@@ -7694,10 +7456,10 @@
           <p:nvPr/>
         </p:nvPicPr>
         <p:blipFill>
-          <a:blip r:embed="rId15">
+          <a:blip r:embed="rId13">
             <a:extLst>
               <a:ext uri="{96DAC541-7B7A-43D3-8B79-37D633B846F1}">
-                <asvg:svgBlip xmlns:asvg="http://schemas.microsoft.com/office/drawing/2016/SVG/main" r:embed="rId16"/>
+                <asvg:svgBlip xmlns:asvg="http://schemas.microsoft.com/office/drawing/2016/SVG/main" r:embed="rId14"/>
               </a:ext>
             </a:extLst>
           </a:blip>
@@ -7707,7 +7469,7 @@
         </p:blipFill>
         <p:spPr>
           <a:xfrm>
-            <a:off x="4142232" y="4151376"/>
+            <a:off x="4246954" y="4151376"/>
             <a:ext cx="457200" cy="457200"/>
           </a:xfrm>
           <a:prstGeom prst="rect">
@@ -7730,10 +7492,10 @@
           <p:nvPr/>
         </p:nvPicPr>
         <p:blipFill>
-          <a:blip r:embed="rId17">
+          <a:blip r:embed="rId15">
             <a:extLst>
               <a:ext uri="{96DAC541-7B7A-43D3-8B79-37D633B846F1}">
-                <asvg:svgBlip xmlns:asvg="http://schemas.microsoft.com/office/drawing/2016/SVG/main" r:embed="rId18"/>
+                <asvg:svgBlip xmlns:asvg="http://schemas.microsoft.com/office/drawing/2016/SVG/main" r:embed="rId16"/>
               </a:ext>
             </a:extLst>
           </a:blip>
@@ -7742,7 +7504,7 @@
         </p:blipFill>
         <p:spPr bwMode="auto">
           <a:xfrm>
-            <a:off x="7296912" y="795528"/>
+            <a:off x="7296912" y="766888"/>
             <a:ext cx="762000" cy="762000"/>
           </a:xfrm>
           <a:prstGeom prst="rect">
@@ -7788,10 +7550,10 @@
           <p:nvPr/>
         </p:nvPicPr>
         <p:blipFill>
-          <a:blip r:embed="rId19">
+          <a:blip r:embed="rId17">
             <a:extLst>
               <a:ext uri="{96DAC541-7B7A-43D3-8B79-37D633B846F1}">
-                <asvg:svgBlip xmlns:asvg="http://schemas.microsoft.com/office/drawing/2016/SVG/main" r:embed="rId20"/>
+                <asvg:svgBlip xmlns:asvg="http://schemas.microsoft.com/office/drawing/2016/SVG/main" r:embed="rId18"/>
               </a:ext>
             </a:extLst>
           </a:blip>
@@ -7846,10 +7608,10 @@
           <p:nvPr/>
         </p:nvPicPr>
         <p:blipFill>
-          <a:blip r:embed="rId19">
+          <a:blip r:embed="rId17">
             <a:extLst>
               <a:ext uri="{96DAC541-7B7A-43D3-8B79-37D633B846F1}">
-                <asvg:svgBlip xmlns:asvg="http://schemas.microsoft.com/office/drawing/2016/SVG/main" r:embed="rId20"/>
+                <asvg:svgBlip xmlns:asvg="http://schemas.microsoft.com/office/drawing/2016/SVG/main" r:embed="rId18"/>
               </a:ext>
             </a:extLst>
           </a:blip>
@@ -7904,10 +7666,10 @@
           <p:nvPr/>
         </p:nvPicPr>
         <p:blipFill>
-          <a:blip r:embed="rId21">
+          <a:blip r:embed="rId19">
             <a:extLst>
               <a:ext uri="{96DAC541-7B7A-43D3-8B79-37D633B846F1}">
-                <asvg:svgBlip xmlns:asvg="http://schemas.microsoft.com/office/drawing/2016/SVG/main" r:embed="rId22"/>
+                <asvg:svgBlip xmlns:asvg="http://schemas.microsoft.com/office/drawing/2016/SVG/main" r:embed="rId20"/>
               </a:ext>
             </a:extLst>
           </a:blip>
@@ -7940,10 +7702,10 @@
           <p:nvPr/>
         </p:nvPicPr>
         <p:blipFill>
-          <a:blip r:embed="rId23">
+          <a:blip r:embed="rId21">
             <a:extLst>
               <a:ext uri="{96DAC541-7B7A-43D3-8B79-37D633B846F1}">
-                <asvg:svgBlip xmlns:asvg="http://schemas.microsoft.com/office/drawing/2016/SVG/main" r:embed="rId24"/>
+                <asvg:svgBlip xmlns:asvg="http://schemas.microsoft.com/office/drawing/2016/SVG/main" r:embed="rId22"/>
               </a:ext>
             </a:extLst>
           </a:blip>
@@ -7961,6 +7723,158 @@
           </a:prstGeom>
         </p:spPr>
       </p:pic>
+      <p:pic>
+        <p:nvPicPr>
+          <p:cNvPr id="2" name="Graphic 22">
+            <a:extLst>
+              <a:ext uri="{FF2B5EF4-FFF2-40B4-BE49-F238E27FC236}">
+                <a16:creationId xmlns:a16="http://schemas.microsoft.com/office/drawing/2014/main" id="{A1FC6C44-8793-2A0B-6082-8B5B8F10FBDD}"/>
+              </a:ext>
+            </a:extLst>
+          </p:cNvPr>
+          <p:cNvPicPr>
+            <a:picLocks noChangeAspect="1" noChangeArrowheads="1"/>
+          </p:cNvPicPr>
+          <p:nvPr/>
+        </p:nvPicPr>
+        <p:blipFill>
+          <a:blip r:embed="rId23">
+            <a:extLst>
+              <a:ext uri="{96DAC541-7B7A-43D3-8B79-37D633B846F1}">
+                <asvg:svgBlip xmlns:asvg="http://schemas.microsoft.com/office/drawing/2016/SVG/main" r:embed="rId24"/>
+              </a:ext>
+            </a:extLst>
+          </a:blip>
+          <a:srcRect/>
+          <a:stretch/>
+        </p:blipFill>
+        <p:spPr bwMode="auto">
+          <a:xfrm>
+            <a:off x="466090" y="2523744"/>
+            <a:ext cx="457200" cy="457200"/>
+          </a:xfrm>
+          <a:prstGeom prst="rect">
+            <a:avLst/>
+          </a:prstGeom>
+          <a:noFill/>
+          <a:ln>
+            <a:noFill/>
+          </a:ln>
+          <a:extLst>
+            <a:ext uri="{909E8E84-426E-40DD-AFC4-6F175D3DCCD1}">
+              <a14:hiddenFill xmlns:a14="http://schemas.microsoft.com/office/drawing/2010/main">
+                <a:solidFill>
+                  <a:srgbClr val="FFFFFF"/>
+                </a:solidFill>
+              </a14:hiddenFill>
+            </a:ext>
+            <a:ext uri="{91240B29-F687-4F45-9708-019B960494DF}">
+              <a14:hiddenLine xmlns:a14="http://schemas.microsoft.com/office/drawing/2010/main" w="9525">
+                <a:solidFill>
+                  <a:srgbClr val="000000"/>
+                </a:solidFill>
+                <a:miter lim="800000"/>
+                <a:headEnd/>
+                <a:tailEnd/>
+              </a14:hiddenLine>
+            </a:ext>
+          </a:extLst>
+        </p:spPr>
+      </p:pic>
+      <p:cxnSp>
+        <p:nvCxnSpPr>
+          <p:cNvPr id="28" name="Elbow Connector 27">
+            <a:extLst>
+              <a:ext uri="{FF2B5EF4-FFF2-40B4-BE49-F238E27FC236}">
+                <a16:creationId xmlns:a16="http://schemas.microsoft.com/office/drawing/2014/main" id="{40BA69F7-8622-8232-40DC-A6DA4504B745}"/>
+              </a:ext>
+            </a:extLst>
+          </p:cNvPr>
+          <p:cNvCxnSpPr>
+            <a:cxnSpLocks/>
+            <a:stCxn id="58" idx="3"/>
+            <a:endCxn id="157" idx="2"/>
+          </p:cNvCxnSpPr>
+          <p:nvPr/>
+        </p:nvCxnSpPr>
+        <p:spPr>
+          <a:xfrm flipV="1">
+            <a:off x="7107936" y="1795719"/>
+            <a:ext cx="566253" cy="985754"/>
+          </a:xfrm>
+          <a:prstGeom prst="bentConnector2">
+            <a:avLst/>
+          </a:prstGeom>
+          <a:ln w="15875">
+            <a:solidFill>
+              <a:schemeClr val="tx2"/>
+            </a:solidFill>
+            <a:headEnd type="none" w="med" len="sm"/>
+            <a:tailEnd type="arrow" w="med" len="sm"/>
+          </a:ln>
+        </p:spPr>
+        <p:style>
+          <a:lnRef idx="1">
+            <a:schemeClr val="accent1"/>
+          </a:lnRef>
+          <a:fillRef idx="0">
+            <a:schemeClr val="accent1"/>
+          </a:fillRef>
+          <a:effectRef idx="0">
+            <a:schemeClr val="accent1"/>
+          </a:effectRef>
+          <a:fontRef idx="minor">
+            <a:schemeClr val="tx1"/>
+          </a:fontRef>
+        </p:style>
+      </p:cxnSp>
+      <p:cxnSp>
+        <p:nvCxnSpPr>
+          <p:cNvPr id="32" name="Elbow Connector 31">
+            <a:extLst>
+              <a:ext uri="{FF2B5EF4-FFF2-40B4-BE49-F238E27FC236}">
+                <a16:creationId xmlns:a16="http://schemas.microsoft.com/office/drawing/2014/main" id="{7903F48C-67A6-4D29-89A7-E962D3B06240}"/>
+              </a:ext>
+            </a:extLst>
+          </p:cNvPr>
+          <p:cNvCxnSpPr>
+            <a:cxnSpLocks/>
+            <a:stCxn id="155" idx="2"/>
+            <a:endCxn id="65" idx="3"/>
+          </p:cNvCxnSpPr>
+          <p:nvPr/>
+        </p:nvCxnSpPr>
+        <p:spPr>
+          <a:xfrm rot="5400000">
+            <a:off x="5249965" y="2896562"/>
+            <a:ext cx="937603" cy="2029224"/>
+          </a:xfrm>
+          <a:prstGeom prst="bentConnector2">
+            <a:avLst/>
+          </a:prstGeom>
+          <a:ln w="15875">
+            <a:solidFill>
+              <a:schemeClr val="tx2"/>
+            </a:solidFill>
+            <a:headEnd type="none" w="med" len="sm"/>
+            <a:tailEnd type="arrow" w="med" len="sm"/>
+          </a:ln>
+        </p:spPr>
+        <p:style>
+          <a:lnRef idx="1">
+            <a:schemeClr val="accent1"/>
+          </a:lnRef>
+          <a:fillRef idx="0">
+            <a:schemeClr val="accent1"/>
+          </a:fillRef>
+          <a:effectRef idx="0">
+            <a:schemeClr val="accent1"/>
+          </a:effectRef>
+          <a:fontRef idx="minor">
+            <a:schemeClr val="tx1"/>
+          </a:fontRef>
+        </p:style>
+      </p:cxnSp>
     </p:spTree>
     <p:extLst>
       <p:ext uri="{BB962C8B-B14F-4D97-AF65-F5344CB8AC3E}">

</xml_diff>